<commit_message>
Phase 1 & 2 Prometheus 2.0
</commit_message>
<xml_diff>
--- a/ui/Mockups/2.0 Mockup.pptx
+++ b/ui/Mockups/2.0 Mockup.pptx
@@ -5,12 +5,13 @@
     <p:sldMasterId id="2147483660" r:id="rId1"/>
   </p:sldMasterIdLst>
   <p:sldIdLst>
-    <p:sldId id="275" r:id="rId2"/>
-    <p:sldId id="274" r:id="rId3"/>
-    <p:sldId id="277" r:id="rId4"/>
-    <p:sldId id="279" r:id="rId5"/>
-    <p:sldId id="278" r:id="rId6"/>
-    <p:sldId id="280" r:id="rId7"/>
+    <p:sldId id="281" r:id="rId2"/>
+    <p:sldId id="275" r:id="rId3"/>
+    <p:sldId id="274" r:id="rId4"/>
+    <p:sldId id="277" r:id="rId5"/>
+    <p:sldId id="279" r:id="rId6"/>
+    <p:sldId id="278" r:id="rId7"/>
+    <p:sldId id="280" r:id="rId8"/>
   </p:sldIdLst>
   <p:sldSz cx="12192000" cy="6858000"/>
   <p:notesSz cx="6858000" cy="9144000"/>
@@ -120,7 +121,7 @@
 <file path=ppt/revisionInfo.xml><?xml version="1.0" encoding="utf-8"?>
 <p1510:revInfo xmlns:a="http://schemas.openxmlformats.org/drawingml/2006/main" xmlns:r="http://schemas.openxmlformats.org/officeDocument/2006/relationships" xmlns:p1510="http://schemas.microsoft.com/office/powerpoint/2015/10/main">
   <p1510:revLst>
-    <p1510:client id="{1698752C-40A3-4F61-BEE2-EB27DCB6A3E7}" v="7" dt="2025-12-07T07:55:20.640"/>
+    <p1510:client id="{1698752C-40A3-4F61-BEE2-EB27DCB6A3E7}" v="21" dt="2025-12-08T13:59:45.132"/>
   </p1510:revLst>
 </p1510:revInfo>
 </file>
@@ -129,8 +130,8 @@
 <pc:chgInfo xmlns:a="http://schemas.openxmlformats.org/drawingml/2006/main" xmlns:r="http://schemas.openxmlformats.org/officeDocument/2006/relationships" xmlns:ac="http://schemas.microsoft.com/office/drawing/2013/main/command" xmlns:pc="http://schemas.microsoft.com/office/powerpoint/2013/main/command">
   <pc:docChgLst>
     <pc:chgData name="Matthew Dodds" userId="80d5a6ea92063750" providerId="LiveId" clId="{614D3421-716A-4CB0-994B-C24DF82A0F6F}"/>
-    <pc:docChg chg="delSld modSld">
-      <pc:chgData name="Matthew Dodds" userId="80d5a6ea92063750" providerId="LiveId" clId="{614D3421-716A-4CB0-994B-C24DF82A0F6F}" dt="2025-12-07T07:55:33.967" v="65" actId="47"/>
+    <pc:docChg chg="undo custSel addSld delSld modSld sldOrd">
+      <pc:chgData name="Matthew Dodds" userId="80d5a6ea92063750" providerId="LiveId" clId="{614D3421-716A-4CB0-994B-C24DF82A0F6F}" dt="2025-12-08T14:02:03.436" v="626" actId="1037"/>
       <pc:docMkLst>
         <pc:docMk/>
       </pc:docMkLst>
@@ -155,12 +156,52 @@
           <pc:sldMk cId="3156259511" sldId="273"/>
         </pc:sldMkLst>
       </pc:sldChg>
-      <pc:sldChg chg="addSp modSp">
-        <pc:chgData name="Matthew Dodds" userId="80d5a6ea92063750" providerId="LiveId" clId="{614D3421-716A-4CB0-994B-C24DF82A0F6F}" dt="2025-12-07T07:55:20.640" v="64"/>
+      <pc:sldChg chg="addSp modSp mod">
+        <pc:chgData name="Matthew Dodds" userId="80d5a6ea92063750" providerId="LiveId" clId="{614D3421-716A-4CB0-994B-C24DF82A0F6F}" dt="2025-12-08T14:02:03.436" v="626" actId="1037"/>
         <pc:sldMkLst>
           <pc:docMk/>
           <pc:sldMk cId="609062764" sldId="274"/>
         </pc:sldMkLst>
+        <pc:spChg chg="mod">
+          <ac:chgData name="Matthew Dodds" userId="80d5a6ea92063750" providerId="LiveId" clId="{614D3421-716A-4CB0-994B-C24DF82A0F6F}" dt="2025-12-08T14:01:53.700" v="619" actId="1037"/>
+          <ac:spMkLst>
+            <pc:docMk/>
+            <pc:sldMk cId="609062764" sldId="274"/>
+            <ac:spMk id="6" creationId="{23AA74E7-8287-FB84-F0B5-0870B01E332A}"/>
+          </ac:spMkLst>
+        </pc:spChg>
+        <pc:spChg chg="mod">
+          <ac:chgData name="Matthew Dodds" userId="80d5a6ea92063750" providerId="LiveId" clId="{614D3421-716A-4CB0-994B-C24DF82A0F6F}" dt="2025-12-08T14:00:12.979" v="465" actId="20577"/>
+          <ac:spMkLst>
+            <pc:docMk/>
+            <pc:sldMk cId="609062764" sldId="274"/>
+            <ac:spMk id="25" creationId="{88997FA6-D161-C276-ABC1-C1083E5A76AA}"/>
+          </ac:spMkLst>
+        </pc:spChg>
+        <pc:spChg chg="mod">
+          <ac:chgData name="Matthew Dodds" userId="80d5a6ea92063750" providerId="LiveId" clId="{614D3421-716A-4CB0-994B-C24DF82A0F6F}" dt="2025-12-08T06:27:24.106" v="418" actId="1076"/>
+          <ac:spMkLst>
+            <pc:docMk/>
+            <pc:sldMk cId="609062764" sldId="274"/>
+            <ac:spMk id="95" creationId="{A99A1CC4-6C50-C8A1-351D-F2F5ADE8743F}"/>
+          </ac:spMkLst>
+        </pc:spChg>
+        <pc:spChg chg="mod">
+          <ac:chgData name="Matthew Dodds" userId="80d5a6ea92063750" providerId="LiveId" clId="{614D3421-716A-4CB0-994B-C24DF82A0F6F}" dt="2025-12-08T04:40:37.770" v="414" actId="692"/>
+          <ac:spMkLst>
+            <pc:docMk/>
+            <pc:sldMk cId="609062764" sldId="274"/>
+            <ac:spMk id="96" creationId="{331B5719-FF29-87A3-BDC8-02286547D2C3}"/>
+          </ac:spMkLst>
+        </pc:spChg>
+        <pc:spChg chg="mod">
+          <ac:chgData name="Matthew Dodds" userId="80d5a6ea92063750" providerId="LiveId" clId="{614D3421-716A-4CB0-994B-C24DF82A0F6F}" dt="2025-12-08T14:02:03.436" v="626" actId="1037"/>
+          <ac:spMkLst>
+            <pc:docMk/>
+            <pc:sldMk cId="609062764" sldId="274"/>
+            <ac:spMk id="97" creationId="{C351991A-54B6-BC99-1C6B-351DBDD51FA6}"/>
+          </ac:spMkLst>
+        </pc:spChg>
         <pc:spChg chg="add mod">
           <ac:chgData name="Matthew Dodds" userId="80d5a6ea92063750" providerId="LiveId" clId="{614D3421-716A-4CB0-994B-C24DF82A0F6F}" dt="2025-12-07T07:55:20.640" v="64"/>
           <ac:spMkLst>
@@ -177,23 +218,143 @@
             <ac:spMk id="99" creationId="{D014B74E-1029-AF6B-DD60-D1E832CB15E1}"/>
           </ac:spMkLst>
         </pc:spChg>
+        <pc:grpChg chg="add mod">
+          <ac:chgData name="Matthew Dodds" userId="80d5a6ea92063750" providerId="LiveId" clId="{614D3421-716A-4CB0-994B-C24DF82A0F6F}" dt="2025-12-08T13:59:50.538" v="452" actId="1036"/>
+          <ac:grpSpMkLst>
+            <pc:docMk/>
+            <pc:sldMk cId="609062764" sldId="274"/>
+            <ac:grpSpMk id="3" creationId="{4E5F1594-B012-25CA-4983-3D809FED4C5F}"/>
+          </ac:grpSpMkLst>
+        </pc:grpChg>
+        <pc:grpChg chg="mod">
+          <ac:chgData name="Matthew Dodds" userId="80d5a6ea92063750" providerId="LiveId" clId="{614D3421-716A-4CB0-994B-C24DF82A0F6F}" dt="2025-12-08T13:59:45.132" v="444" actId="164"/>
+          <ac:grpSpMkLst>
+            <pc:docMk/>
+            <pc:sldMk cId="609062764" sldId="274"/>
+            <ac:grpSpMk id="28" creationId="{E78CE5DE-E50C-639F-54C9-F510E1D54B32}"/>
+          </ac:grpSpMkLst>
+        </pc:grpChg>
+        <pc:cxnChg chg="mod">
+          <ac:chgData name="Matthew Dodds" userId="80d5a6ea92063750" providerId="LiveId" clId="{614D3421-716A-4CB0-994B-C24DF82A0F6F}" dt="2025-12-08T14:01:01.130" v="605" actId="14100"/>
+          <ac:cxnSpMkLst>
+            <pc:docMk/>
+            <pc:sldMk cId="609062764" sldId="274"/>
+            <ac:cxnSpMk id="29" creationId="{CAD7DB08-D882-8A04-4242-5146CB2DDCDA}"/>
+          </ac:cxnSpMkLst>
+        </pc:cxnChg>
+        <pc:cxnChg chg="mod">
+          <ac:chgData name="Matthew Dodds" userId="80d5a6ea92063750" providerId="LiveId" clId="{614D3421-716A-4CB0-994B-C24DF82A0F6F}" dt="2025-12-08T14:00:55.675" v="604" actId="14100"/>
+          <ac:cxnSpMkLst>
+            <pc:docMk/>
+            <pc:sldMk cId="609062764" sldId="274"/>
+            <ac:cxnSpMk id="30" creationId="{919D88B7-3CC7-C445-5305-99EDEE2E5A45}"/>
+          </ac:cxnSpMkLst>
+        </pc:cxnChg>
       </pc:sldChg>
       <pc:sldChg chg="addSp modSp mod">
-        <pc:chgData name="Matthew Dodds" userId="80d5a6ea92063750" providerId="LiveId" clId="{614D3421-716A-4CB0-994B-C24DF82A0F6F}" dt="2025-12-07T07:52:05.688" v="48" actId="692"/>
+        <pc:chgData name="Matthew Dodds" userId="80d5a6ea92063750" providerId="LiveId" clId="{614D3421-716A-4CB0-994B-C24DF82A0F6F}" dt="2025-12-07T16:56:24.652" v="409" actId="2711"/>
         <pc:sldMkLst>
           <pc:docMk/>
           <pc:sldMk cId="4164517435" sldId="275"/>
         </pc:sldMkLst>
         <pc:spChg chg="mod">
-          <ac:chgData name="Matthew Dodds" userId="80d5a6ea92063750" providerId="LiveId" clId="{614D3421-716A-4CB0-994B-C24DF82A0F6F}" dt="2025-12-07T07:51:18.116" v="6" actId="1035"/>
+          <ac:chgData name="Matthew Dodds" userId="80d5a6ea92063750" providerId="LiveId" clId="{614D3421-716A-4CB0-994B-C24DF82A0F6F}" dt="2025-12-07T16:55:48.276" v="403" actId="1036"/>
           <ac:spMkLst>
             <pc:docMk/>
             <pc:sldMk cId="4164517435" sldId="275"/>
             <ac:spMk id="2" creationId="{733AFC69-F7A5-5694-E479-4D623FD269ED}"/>
           </ac:spMkLst>
         </pc:spChg>
+        <pc:spChg chg="mod">
+          <ac:chgData name="Matthew Dodds" userId="80d5a6ea92063750" providerId="LiveId" clId="{614D3421-716A-4CB0-994B-C24DF82A0F6F}" dt="2025-12-07T16:55:39.784" v="401" actId="14100"/>
+          <ac:spMkLst>
+            <pc:docMk/>
+            <pc:sldMk cId="4164517435" sldId="275"/>
+            <ac:spMk id="4" creationId="{09E29F80-AB15-304A-A0EC-4E5C69454E48}"/>
+          </ac:spMkLst>
+        </pc:spChg>
+        <pc:spChg chg="mod">
+          <ac:chgData name="Matthew Dodds" userId="80d5a6ea92063750" providerId="LiveId" clId="{614D3421-716A-4CB0-994B-C24DF82A0F6F}" dt="2025-12-07T16:56:24.652" v="409" actId="2711"/>
+          <ac:spMkLst>
+            <pc:docMk/>
+            <pc:sldMk cId="4164517435" sldId="275"/>
+            <ac:spMk id="5" creationId="{F51AB63F-E4EB-FAA6-439C-0B270A2BEEAD}"/>
+          </ac:spMkLst>
+        </pc:spChg>
+        <pc:spChg chg="add mod">
+          <ac:chgData name="Matthew Dodds" userId="80d5a6ea92063750" providerId="LiveId" clId="{614D3421-716A-4CB0-994B-C24DF82A0F6F}" dt="2025-12-07T16:12:41.714" v="288" actId="20577"/>
+          <ac:spMkLst>
+            <pc:docMk/>
+            <pc:sldMk cId="4164517435" sldId="275"/>
+            <ac:spMk id="10" creationId="{18D8A8E8-C6E2-E267-08D3-8ECF430B341D}"/>
+          </ac:spMkLst>
+        </pc:spChg>
+        <pc:spChg chg="add mod">
+          <ac:chgData name="Matthew Dodds" userId="80d5a6ea92063750" providerId="LiveId" clId="{614D3421-716A-4CB0-994B-C24DF82A0F6F}" dt="2025-12-07T16:12:36.264" v="280" actId="1076"/>
+          <ac:spMkLst>
+            <pc:docMk/>
+            <pc:sldMk cId="4164517435" sldId="275"/>
+            <ac:spMk id="11" creationId="{0A1F18CA-665A-927D-1031-82750E4ADC11}"/>
+          </ac:spMkLst>
+        </pc:spChg>
+        <pc:spChg chg="add mod">
+          <ac:chgData name="Matthew Dodds" userId="80d5a6ea92063750" providerId="LiveId" clId="{614D3421-716A-4CB0-994B-C24DF82A0F6F}" dt="2025-12-07T16:12:57.847" v="298" actId="20577"/>
+          <ac:spMkLst>
+            <pc:docMk/>
+            <pc:sldMk cId="4164517435" sldId="275"/>
+            <ac:spMk id="12" creationId="{532ACE2D-71D2-4B47-3687-0ECAF8DADDC6}"/>
+          </ac:spMkLst>
+        </pc:spChg>
+        <pc:spChg chg="add mod">
+          <ac:chgData name="Matthew Dodds" userId="80d5a6ea92063750" providerId="LiveId" clId="{614D3421-716A-4CB0-994B-C24DF82A0F6F}" dt="2025-12-07T16:12:53.209" v="290" actId="1076"/>
+          <ac:spMkLst>
+            <pc:docMk/>
+            <pc:sldMk cId="4164517435" sldId="275"/>
+            <ac:spMk id="13" creationId="{0A75EA01-C642-DB0B-3FA2-EAE8F28D7B82}"/>
+          </ac:spMkLst>
+        </pc:spChg>
+        <pc:spChg chg="mod">
+          <ac:chgData name="Matthew Dodds" userId="80d5a6ea92063750" providerId="LiveId" clId="{614D3421-716A-4CB0-994B-C24DF82A0F6F}" dt="2025-12-07T16:13:16.550" v="299"/>
+          <ac:spMkLst>
+            <pc:docMk/>
+            <pc:sldMk cId="4164517435" sldId="275"/>
+            <ac:spMk id="15" creationId="{35441878-7E53-61F3-968D-EE77B9019815}"/>
+          </ac:spMkLst>
+        </pc:spChg>
+        <pc:spChg chg="mod">
+          <ac:chgData name="Matthew Dodds" userId="80d5a6ea92063750" providerId="LiveId" clId="{614D3421-716A-4CB0-994B-C24DF82A0F6F}" dt="2025-12-07T16:13:26.070" v="305" actId="20577"/>
+          <ac:spMkLst>
+            <pc:docMk/>
+            <pc:sldMk cId="4164517435" sldId="275"/>
+            <ac:spMk id="16" creationId="{F4E64D29-517B-04C2-86CE-FB3CBC9E1B36}"/>
+          </ac:spMkLst>
+        </pc:spChg>
+        <pc:spChg chg="add mod">
+          <ac:chgData name="Matthew Dodds" userId="80d5a6ea92063750" providerId="LiveId" clId="{614D3421-716A-4CB0-994B-C24DF82A0F6F}" dt="2025-12-07T16:15:16.696" v="372" actId="1076"/>
+          <ac:spMkLst>
+            <pc:docMk/>
+            <pc:sldMk cId="4164517435" sldId="275"/>
+            <ac:spMk id="17" creationId="{20DCDA29-DBFE-A936-0FBA-6D2A784CF5D9}"/>
+          </ac:spMkLst>
+        </pc:spChg>
+        <pc:spChg chg="add mod">
+          <ac:chgData name="Matthew Dodds" userId="80d5a6ea92063750" providerId="LiveId" clId="{614D3421-716A-4CB0-994B-C24DF82A0F6F}" dt="2025-12-07T16:15:22.077" v="375" actId="1035"/>
+          <ac:spMkLst>
+            <pc:docMk/>
+            <pc:sldMk cId="4164517435" sldId="275"/>
+            <ac:spMk id="18" creationId="{4D899090-D990-5212-75BB-F20B1DD648FD}"/>
+          </ac:spMkLst>
+        </pc:spChg>
+        <pc:grpChg chg="add mod">
+          <ac:chgData name="Matthew Dodds" userId="80d5a6ea92063750" providerId="LiveId" clId="{614D3421-716A-4CB0-994B-C24DF82A0F6F}" dt="2025-12-07T16:14:06.236" v="308" actId="14100"/>
+          <ac:grpSpMkLst>
+            <pc:docMk/>
+            <pc:sldMk cId="4164517435" sldId="275"/>
+            <ac:grpSpMk id="14" creationId="{8EA7D2FE-1EDC-540D-53FC-A64633FD50E0}"/>
+          </ac:grpSpMkLst>
+        </pc:grpChg>
         <pc:cxnChg chg="add mod">
-          <ac:chgData name="Matthew Dodds" userId="80d5a6ea92063750" providerId="LiveId" clId="{614D3421-716A-4CB0-994B-C24DF82A0F6F}" dt="2025-12-07T07:52:05.688" v="48" actId="692"/>
+          <ac:chgData name="Matthew Dodds" userId="80d5a6ea92063750" providerId="LiveId" clId="{614D3421-716A-4CB0-994B-C24DF82A0F6F}" dt="2025-12-07T16:06:29.910" v="264" actId="1035"/>
           <ac:cxnSpMkLst>
             <pc:docMk/>
             <pc:sldMk cId="4164517435" sldId="275"/>
@@ -208,12 +369,28 @@
           <pc:sldMk cId="4229824937" sldId="276"/>
         </pc:sldMkLst>
       </pc:sldChg>
-      <pc:sldChg chg="addSp modSp">
-        <pc:chgData name="Matthew Dodds" userId="80d5a6ea92063750" providerId="LiveId" clId="{614D3421-716A-4CB0-994B-C24DF82A0F6F}" dt="2025-12-07T07:55:18.691" v="63"/>
+      <pc:sldChg chg="addSp delSp modSp mod">
+        <pc:chgData name="Matthew Dodds" userId="80d5a6ea92063750" providerId="LiveId" clId="{614D3421-716A-4CB0-994B-C24DF82A0F6F}" dt="2025-12-08T13:58:09.426" v="442" actId="1036"/>
         <pc:sldMkLst>
           <pc:docMk/>
           <pc:sldMk cId="1268873129" sldId="277"/>
         </pc:sldMkLst>
+        <pc:spChg chg="add mod">
+          <ac:chgData name="Matthew Dodds" userId="80d5a6ea92063750" providerId="LiveId" clId="{614D3421-716A-4CB0-994B-C24DF82A0F6F}" dt="2025-12-08T06:27:34.644" v="421" actId="1076"/>
+          <ac:spMkLst>
+            <pc:docMk/>
+            <pc:sldMk cId="1268873129" sldId="277"/>
+            <ac:spMk id="3" creationId="{B31A8A6F-23DF-99DE-5881-D88ECE8C0FC6}"/>
+          </ac:spMkLst>
+        </pc:spChg>
+        <pc:spChg chg="del">
+          <ac:chgData name="Matthew Dodds" userId="80d5a6ea92063750" providerId="LiveId" clId="{614D3421-716A-4CB0-994B-C24DF82A0F6F}" dt="2025-12-08T06:27:30.163" v="419" actId="478"/>
+          <ac:spMkLst>
+            <pc:docMk/>
+            <pc:sldMk cId="1268873129" sldId="277"/>
+            <ac:spMk id="95" creationId="{84D387BA-9669-8738-25D6-1A58CE4D7FF1}"/>
+          </ac:spMkLst>
+        </pc:spChg>
         <pc:spChg chg="add mod">
           <ac:chgData name="Matthew Dodds" userId="80d5a6ea92063750" providerId="LiveId" clId="{614D3421-716A-4CB0-994B-C24DF82A0F6F}" dt="2025-12-07T07:55:18.691" v="63"/>
           <ac:spMkLst>
@@ -230,13 +407,37 @@
             <ac:spMk id="121" creationId="{D8F80CFD-449B-85BE-AEDA-85D04DAA1DF1}"/>
           </ac:spMkLst>
         </pc:spChg>
+        <pc:cxnChg chg="mod">
+          <ac:chgData name="Matthew Dodds" userId="80d5a6ea92063750" providerId="LiveId" clId="{614D3421-716A-4CB0-994B-C24DF82A0F6F}" dt="2025-12-08T13:58:09.426" v="442" actId="1036"/>
+          <ac:cxnSpMkLst>
+            <pc:docMk/>
+            <pc:sldMk cId="1268873129" sldId="277"/>
+            <ac:cxnSpMk id="48" creationId="{FF6D2B49-459B-48ED-871D-8BEFA262D91F}"/>
+          </ac:cxnSpMkLst>
+        </pc:cxnChg>
       </pc:sldChg>
-      <pc:sldChg chg="addSp modSp">
-        <pc:chgData name="Matthew Dodds" userId="80d5a6ea92063750" providerId="LiveId" clId="{614D3421-716A-4CB0-994B-C24DF82A0F6F}" dt="2025-12-07T07:55:12.997" v="61"/>
+      <pc:sldChg chg="addSp delSp modSp mod">
+        <pc:chgData name="Matthew Dodds" userId="80d5a6ea92063750" providerId="LiveId" clId="{614D3421-716A-4CB0-994B-C24DF82A0F6F}" dt="2025-12-08T06:27:54.476" v="427" actId="1076"/>
         <pc:sldMkLst>
           <pc:docMk/>
           <pc:sldMk cId="2371583876" sldId="278"/>
         </pc:sldMkLst>
+        <pc:spChg chg="add mod">
+          <ac:chgData name="Matthew Dodds" userId="80d5a6ea92063750" providerId="LiveId" clId="{614D3421-716A-4CB0-994B-C24DF82A0F6F}" dt="2025-12-08T06:27:54.476" v="427" actId="1076"/>
+          <ac:spMkLst>
+            <pc:docMk/>
+            <pc:sldMk cId="2371583876" sldId="278"/>
+            <ac:spMk id="5" creationId="{D428CFBC-ECD4-FA15-C921-E7BE60D235A2}"/>
+          </ac:spMkLst>
+        </pc:spChg>
+        <pc:spChg chg="del">
+          <ac:chgData name="Matthew Dodds" userId="80d5a6ea92063750" providerId="LiveId" clId="{614D3421-716A-4CB0-994B-C24DF82A0F6F}" dt="2025-12-08T06:27:50.895" v="425" actId="478"/>
+          <ac:spMkLst>
+            <pc:docMk/>
+            <pc:sldMk cId="2371583876" sldId="278"/>
+            <ac:spMk id="95" creationId="{4C052397-6DB2-CC96-AAF7-D4220A876F38}"/>
+          </ac:spMkLst>
+        </pc:spChg>
         <pc:spChg chg="add mod">
           <ac:chgData name="Matthew Dodds" userId="80d5a6ea92063750" providerId="LiveId" clId="{614D3421-716A-4CB0-994B-C24DF82A0F6F}" dt="2025-12-07T07:55:12.997" v="61"/>
           <ac:spMkLst>
@@ -254,8 +455,8 @@
           </ac:spMkLst>
         </pc:spChg>
       </pc:sldChg>
-      <pc:sldChg chg="addSp modSp">
-        <pc:chgData name="Matthew Dodds" userId="80d5a6ea92063750" providerId="LiveId" clId="{614D3421-716A-4CB0-994B-C24DF82A0F6F}" dt="2025-12-07T07:55:15.183" v="62"/>
+      <pc:sldChg chg="addSp delSp modSp mod">
+        <pc:chgData name="Matthew Dodds" userId="80d5a6ea92063750" providerId="LiveId" clId="{614D3421-716A-4CB0-994B-C24DF82A0F6F}" dt="2025-12-08T06:27:47.401" v="424" actId="1076"/>
         <pc:sldMkLst>
           <pc:docMk/>
           <pc:sldMk cId="3480445554" sldId="279"/>
@@ -276,13 +477,165 @@
             <ac:spMk id="68" creationId="{BA5D483F-6FD0-4BB2-8F6B-B37564542FDB}"/>
           </ac:spMkLst>
         </pc:spChg>
+        <pc:spChg chg="add mod">
+          <ac:chgData name="Matthew Dodds" userId="80d5a6ea92063750" providerId="LiveId" clId="{614D3421-716A-4CB0-994B-C24DF82A0F6F}" dt="2025-12-08T06:27:47.401" v="424" actId="1076"/>
+          <ac:spMkLst>
+            <pc:docMk/>
+            <pc:sldMk cId="3480445554" sldId="279"/>
+            <ac:spMk id="72" creationId="{71901250-16DC-DCD7-2ECB-78A3868C36D4}"/>
+          </ac:spMkLst>
+        </pc:spChg>
+        <pc:spChg chg="add mod">
+          <ac:chgData name="Matthew Dodds" userId="80d5a6ea92063750" providerId="LiveId" clId="{614D3421-716A-4CB0-994B-C24DF82A0F6F}" dt="2025-12-07T10:30:55.675" v="116" actId="1076"/>
+          <ac:spMkLst>
+            <pc:docMk/>
+            <pc:sldMk cId="3480445554" sldId="279"/>
+            <ac:spMk id="74" creationId="{9921A843-D704-84EE-C8ED-7F6915EA8BDC}"/>
+          </ac:spMkLst>
+        </pc:spChg>
+        <pc:spChg chg="del">
+          <ac:chgData name="Matthew Dodds" userId="80d5a6ea92063750" providerId="LiveId" clId="{614D3421-716A-4CB0-994B-C24DF82A0F6F}" dt="2025-12-08T06:27:38.270" v="422" actId="478"/>
+          <ac:spMkLst>
+            <pc:docMk/>
+            <pc:sldMk cId="3480445554" sldId="279"/>
+            <ac:spMk id="95" creationId="{88A92E13-BC9E-AD6B-F749-6481714452C6}"/>
+          </ac:spMkLst>
+        </pc:spChg>
+        <pc:grpChg chg="mod">
+          <ac:chgData name="Matthew Dodds" userId="80d5a6ea92063750" providerId="LiveId" clId="{614D3421-716A-4CB0-994B-C24DF82A0F6F}" dt="2025-12-07T10:29:49.295" v="66" actId="1076"/>
+          <ac:grpSpMkLst>
+            <pc:docMk/>
+            <pc:sldMk cId="3480445554" sldId="279"/>
+            <ac:grpSpMk id="15" creationId="{CFF33B93-7FBC-2CE3-EAB0-88ECB0582B5A}"/>
+          </ac:grpSpMkLst>
+        </pc:grpChg>
+        <pc:grpChg chg="mod">
+          <ac:chgData name="Matthew Dodds" userId="80d5a6ea92063750" providerId="LiveId" clId="{614D3421-716A-4CB0-994B-C24DF82A0F6F}" dt="2025-12-07T10:29:49.295" v="66" actId="1076"/>
+          <ac:grpSpMkLst>
+            <pc:docMk/>
+            <pc:sldMk cId="3480445554" sldId="279"/>
+            <ac:grpSpMk id="82" creationId="{E4A9C635-081A-817E-05B1-4B8B13132B78}"/>
+          </ac:grpSpMkLst>
+        </pc:grpChg>
       </pc:sldChg>
-      <pc:sldChg chg="addSp modSp mod">
-        <pc:chgData name="Matthew Dodds" userId="80d5a6ea92063750" providerId="LiveId" clId="{614D3421-716A-4CB0-994B-C24DF82A0F6F}" dt="2025-12-07T07:54:46.383" v="60" actId="692"/>
+      <pc:sldChg chg="addSp delSp modSp mod">
+        <pc:chgData name="Matthew Dodds" userId="80d5a6ea92063750" providerId="LiveId" clId="{614D3421-716A-4CB0-994B-C24DF82A0F6F}" dt="2025-12-08T06:28:03.175" v="430" actId="1076"/>
         <pc:sldMkLst>
           <pc:docMk/>
           <pc:sldMk cId="3449670256" sldId="280"/>
         </pc:sldMkLst>
+        <pc:spChg chg="add mod">
+          <ac:chgData name="Matthew Dodds" userId="80d5a6ea92063750" providerId="LiveId" clId="{614D3421-716A-4CB0-994B-C24DF82A0F6F}" dt="2025-12-07T10:39:22.032" v="221" actId="14100"/>
+          <ac:spMkLst>
+            <pc:docMk/>
+            <pc:sldMk cId="3449670256" sldId="280"/>
+            <ac:spMk id="3" creationId="{7FCF06DF-B034-70FB-12D5-5D9A78421DB2}"/>
+          </ac:spMkLst>
+        </pc:spChg>
+        <pc:spChg chg="add mod">
+          <ac:chgData name="Matthew Dodds" userId="80d5a6ea92063750" providerId="LiveId" clId="{614D3421-716A-4CB0-994B-C24DF82A0F6F}" dt="2025-12-07T10:38:40.953" v="198" actId="1076"/>
+          <ac:spMkLst>
+            <pc:docMk/>
+            <pc:sldMk cId="3449670256" sldId="280"/>
+            <ac:spMk id="5" creationId="{0009D96E-FDC2-82C7-E181-443F8AF51486}"/>
+          </ac:spMkLst>
+        </pc:spChg>
+        <pc:spChg chg="add mod">
+          <ac:chgData name="Matthew Dodds" userId="80d5a6ea92063750" providerId="LiveId" clId="{614D3421-716A-4CB0-994B-C24DF82A0F6F}" dt="2025-12-08T06:28:03.175" v="430" actId="1076"/>
+          <ac:spMkLst>
+            <pc:docMk/>
+            <pc:sldMk cId="3449670256" sldId="280"/>
+            <ac:spMk id="8" creationId="{9C39EF30-00BF-480A-06A3-AE75E5D24457}"/>
+          </ac:spMkLst>
+        </pc:spChg>
+        <pc:spChg chg="mod">
+          <ac:chgData name="Matthew Dodds" userId="80d5a6ea92063750" providerId="LiveId" clId="{614D3421-716A-4CB0-994B-C24DF82A0F6F}" dt="2025-12-07T10:38:57.342" v="206" actId="1036"/>
+          <ac:spMkLst>
+            <pc:docMk/>
+            <pc:sldMk cId="3449670256" sldId="280"/>
+            <ac:spMk id="9" creationId="{95D07245-3032-9E48-1A59-B1CFB22E462C}"/>
+          </ac:spMkLst>
+        </pc:spChg>
+        <pc:spChg chg="mod">
+          <ac:chgData name="Matthew Dodds" userId="80d5a6ea92063750" providerId="LiveId" clId="{614D3421-716A-4CB0-994B-C24DF82A0F6F}" dt="2025-12-07T10:38:57.342" v="206" actId="1036"/>
+          <ac:spMkLst>
+            <pc:docMk/>
+            <pc:sldMk cId="3449670256" sldId="280"/>
+            <ac:spMk id="10" creationId="{EB909DD9-C36E-E2E6-52E9-95D0CD13CECC}"/>
+          </ac:spMkLst>
+        </pc:spChg>
+        <pc:spChg chg="mod">
+          <ac:chgData name="Matthew Dodds" userId="80d5a6ea92063750" providerId="LiveId" clId="{614D3421-716A-4CB0-994B-C24DF82A0F6F}" dt="2025-12-07T10:38:57.342" v="206" actId="1036"/>
+          <ac:spMkLst>
+            <pc:docMk/>
+            <pc:sldMk cId="3449670256" sldId="280"/>
+            <ac:spMk id="13" creationId="{95327B99-AAEF-565D-2B2E-B57933851AE3}"/>
+          </ac:spMkLst>
+        </pc:spChg>
+        <pc:spChg chg="mod">
+          <ac:chgData name="Matthew Dodds" userId="80d5a6ea92063750" providerId="LiveId" clId="{614D3421-716A-4CB0-994B-C24DF82A0F6F}" dt="2025-12-07T10:38:57.342" v="206" actId="1036"/>
+          <ac:spMkLst>
+            <pc:docMk/>
+            <pc:sldMk cId="3449670256" sldId="280"/>
+            <ac:spMk id="15" creationId="{9EDD1FF1-E68D-94BF-C380-F224CB2D6243}"/>
+          </ac:spMkLst>
+        </pc:spChg>
+        <pc:spChg chg="mod">
+          <ac:chgData name="Matthew Dodds" userId="80d5a6ea92063750" providerId="LiveId" clId="{614D3421-716A-4CB0-994B-C24DF82A0F6F}" dt="2025-12-07T10:38:57.342" v="206" actId="1036"/>
+          <ac:spMkLst>
+            <pc:docMk/>
+            <pc:sldMk cId="3449670256" sldId="280"/>
+            <ac:spMk id="16" creationId="{E279A59B-AC2E-702F-3250-2184093CC7E2}"/>
+          </ac:spMkLst>
+        </pc:spChg>
+        <pc:spChg chg="mod">
+          <ac:chgData name="Matthew Dodds" userId="80d5a6ea92063750" providerId="LiveId" clId="{614D3421-716A-4CB0-994B-C24DF82A0F6F}" dt="2025-12-07T10:38:57.342" v="206" actId="1036"/>
+          <ac:spMkLst>
+            <pc:docMk/>
+            <pc:sldMk cId="3449670256" sldId="280"/>
+            <ac:spMk id="18" creationId="{61709B39-8121-C152-F170-DD622AB4CF3E}"/>
+          </ac:spMkLst>
+        </pc:spChg>
+        <pc:spChg chg="mod">
+          <ac:chgData name="Matthew Dodds" userId="80d5a6ea92063750" providerId="LiveId" clId="{614D3421-716A-4CB0-994B-C24DF82A0F6F}" dt="2025-12-07T10:38:57.342" v="206" actId="1036"/>
+          <ac:spMkLst>
+            <pc:docMk/>
+            <pc:sldMk cId="3449670256" sldId="280"/>
+            <ac:spMk id="19" creationId="{2DB48368-9272-8DA4-C708-26DBC3B62F4D}"/>
+          </ac:spMkLst>
+        </pc:spChg>
+        <pc:spChg chg="mod">
+          <ac:chgData name="Matthew Dodds" userId="80d5a6ea92063750" providerId="LiveId" clId="{614D3421-716A-4CB0-994B-C24DF82A0F6F}" dt="2025-12-07T10:38:57.342" v="206" actId="1036"/>
+          <ac:spMkLst>
+            <pc:docMk/>
+            <pc:sldMk cId="3449670256" sldId="280"/>
+            <ac:spMk id="20" creationId="{7A4FCA0F-76AC-1425-7DDA-1E6000FC6090}"/>
+          </ac:spMkLst>
+        </pc:spChg>
+        <pc:spChg chg="mod">
+          <ac:chgData name="Matthew Dodds" userId="80d5a6ea92063750" providerId="LiveId" clId="{614D3421-716A-4CB0-994B-C24DF82A0F6F}" dt="2025-12-07T10:38:57.342" v="206" actId="1036"/>
+          <ac:spMkLst>
+            <pc:docMk/>
+            <pc:sldMk cId="3449670256" sldId="280"/>
+            <ac:spMk id="21" creationId="{B732DF8C-26B2-33B1-81B5-C5D682224270}"/>
+          </ac:spMkLst>
+        </pc:spChg>
+        <pc:spChg chg="mod">
+          <ac:chgData name="Matthew Dodds" userId="80d5a6ea92063750" providerId="LiveId" clId="{614D3421-716A-4CB0-994B-C24DF82A0F6F}" dt="2025-12-07T10:38:57.342" v="206" actId="1036"/>
+          <ac:spMkLst>
+            <pc:docMk/>
+            <pc:sldMk cId="3449670256" sldId="280"/>
+            <ac:spMk id="22" creationId="{17950395-5DAE-7504-06B2-E073FAEEC32B}"/>
+          </ac:spMkLst>
+        </pc:spChg>
+        <pc:spChg chg="mod">
+          <ac:chgData name="Matthew Dodds" userId="80d5a6ea92063750" providerId="LiveId" clId="{614D3421-716A-4CB0-994B-C24DF82A0F6F}" dt="2025-12-07T10:39:16.094" v="220" actId="1036"/>
+          <ac:spMkLst>
+            <pc:docMk/>
+            <pc:sldMk cId="3449670256" sldId="280"/>
+            <ac:spMk id="36" creationId="{1A6569D4-6DED-9FB3-C1E1-9F8DFC639731}"/>
+          </ac:spMkLst>
+        </pc:spChg>
         <pc:spChg chg="add mod">
           <ac:chgData name="Matthew Dodds" userId="80d5a6ea92063750" providerId="LiveId" clId="{614D3421-716A-4CB0-994B-C24DF82A0F6F}" dt="2025-12-07T07:54:46.383" v="60" actId="692"/>
           <ac:spMkLst>
@@ -299,6 +652,124 @@
             <ac:spMk id="38" creationId="{CDEF58FA-F570-35A9-8D76-3CF88FBB20D6}"/>
           </ac:spMkLst>
         </pc:spChg>
+        <pc:spChg chg="del">
+          <ac:chgData name="Matthew Dodds" userId="80d5a6ea92063750" providerId="LiveId" clId="{614D3421-716A-4CB0-994B-C24DF82A0F6F}" dt="2025-12-08T06:27:57.721" v="428" actId="478"/>
+          <ac:spMkLst>
+            <pc:docMk/>
+            <pc:sldMk cId="3449670256" sldId="280"/>
+            <ac:spMk id="95" creationId="{1D57ABE6-2219-CDD3-982B-775AC47142BD}"/>
+          </ac:spMkLst>
+        </pc:spChg>
+        <pc:grpChg chg="mod">
+          <ac:chgData name="Matthew Dodds" userId="80d5a6ea92063750" providerId="LiveId" clId="{614D3421-716A-4CB0-994B-C24DF82A0F6F}" dt="2025-12-07T10:39:16.094" v="220" actId="1036"/>
+          <ac:grpSpMkLst>
+            <pc:docMk/>
+            <pc:sldMk cId="3449670256" sldId="280"/>
+            <ac:grpSpMk id="32" creationId="{A6182378-1B4F-7794-1EDC-19336E861840}"/>
+          </ac:grpSpMkLst>
+        </pc:grpChg>
+        <pc:grpChg chg="mod">
+          <ac:chgData name="Matthew Dodds" userId="80d5a6ea92063750" providerId="LiveId" clId="{614D3421-716A-4CB0-994B-C24DF82A0F6F}" dt="2025-12-07T10:39:16.094" v="220" actId="1036"/>
+          <ac:grpSpMkLst>
+            <pc:docMk/>
+            <pc:sldMk cId="3449670256" sldId="280"/>
+            <ac:grpSpMk id="33" creationId="{C25CA487-F7BF-78FC-D182-0983729B3825}"/>
+          </ac:grpSpMkLst>
+        </pc:grpChg>
+      </pc:sldChg>
+      <pc:sldChg chg="addSp delSp modSp new del mod setBg">
+        <pc:chgData name="Matthew Dodds" userId="80d5a6ea92063750" providerId="LiveId" clId="{614D3421-716A-4CB0-994B-C24DF82A0F6F}" dt="2025-12-07T18:18:20.329" v="410" actId="47"/>
+        <pc:sldMkLst>
+          <pc:docMk/>
+          <pc:sldMk cId="636671154" sldId="281"/>
+        </pc:sldMkLst>
+        <pc:spChg chg="add mod">
+          <ac:chgData name="Matthew Dodds" userId="80d5a6ea92063750" providerId="LiveId" clId="{614D3421-716A-4CB0-994B-C24DF82A0F6F}" dt="2025-12-07T16:53:45.886" v="394" actId="339"/>
+          <ac:spMkLst>
+            <pc:docMk/>
+            <pc:sldMk cId="636671154" sldId="281"/>
+            <ac:spMk id="4" creationId="{CD89ED3E-8B14-953B-FA6F-DF618D5B059B}"/>
+          </ac:spMkLst>
+        </pc:spChg>
+        <pc:picChg chg="add del mod">
+          <ac:chgData name="Matthew Dodds" userId="80d5a6ea92063750" providerId="LiveId" clId="{614D3421-716A-4CB0-994B-C24DF82A0F6F}" dt="2025-12-07T16:52:51.919" v="389" actId="478"/>
+          <ac:picMkLst>
+            <pc:docMk/>
+            <pc:sldMk cId="636671154" sldId="281"/>
+            <ac:picMk id="3" creationId="{EFE33D3F-61A2-9305-BB6B-F32AC4BEB508}"/>
+          </ac:picMkLst>
+        </pc:picChg>
+      </pc:sldChg>
+      <pc:sldChg chg="delSp modSp add mod ord">
+        <pc:chgData name="Matthew Dodds" userId="80d5a6ea92063750" providerId="LiveId" clId="{614D3421-716A-4CB0-994B-C24DF82A0F6F}" dt="2025-12-08T06:29:47.190" v="438" actId="14838"/>
+        <pc:sldMkLst>
+          <pc:docMk/>
+          <pc:sldMk cId="4264677433" sldId="281"/>
+        </pc:sldMkLst>
+        <pc:spChg chg="mod">
+          <ac:chgData name="Matthew Dodds" userId="80d5a6ea92063750" providerId="LiveId" clId="{614D3421-716A-4CB0-994B-C24DF82A0F6F}" dt="2025-12-08T06:29:47.190" v="438" actId="14838"/>
+          <ac:spMkLst>
+            <pc:docMk/>
+            <pc:sldMk cId="4264677433" sldId="281"/>
+            <ac:spMk id="5" creationId="{4474B01D-8AA5-0F52-ACED-BFD4BD6F3DD3}"/>
+          </ac:spMkLst>
+        </pc:spChg>
+        <pc:spChg chg="del">
+          <ac:chgData name="Matthew Dodds" userId="80d5a6ea92063750" providerId="LiveId" clId="{614D3421-716A-4CB0-994B-C24DF82A0F6F}" dt="2025-12-08T06:26:42.531" v="416" actId="478"/>
+          <ac:spMkLst>
+            <pc:docMk/>
+            <pc:sldMk cId="4264677433" sldId="281"/>
+            <ac:spMk id="10" creationId="{F87A91FA-AF63-2832-CA20-5EA2369EE522}"/>
+          </ac:spMkLst>
+        </pc:spChg>
+        <pc:spChg chg="del">
+          <ac:chgData name="Matthew Dodds" userId="80d5a6ea92063750" providerId="LiveId" clId="{614D3421-716A-4CB0-994B-C24DF82A0F6F}" dt="2025-12-08T06:26:42.531" v="416" actId="478"/>
+          <ac:spMkLst>
+            <pc:docMk/>
+            <pc:sldMk cId="4264677433" sldId="281"/>
+            <ac:spMk id="11" creationId="{BFA2E9D8-4BFF-EB66-16D0-D2B171F8BCF9}"/>
+          </ac:spMkLst>
+        </pc:spChg>
+        <pc:spChg chg="del">
+          <ac:chgData name="Matthew Dodds" userId="80d5a6ea92063750" providerId="LiveId" clId="{614D3421-716A-4CB0-994B-C24DF82A0F6F}" dt="2025-12-08T06:26:42.531" v="416" actId="478"/>
+          <ac:spMkLst>
+            <pc:docMk/>
+            <pc:sldMk cId="4264677433" sldId="281"/>
+            <ac:spMk id="12" creationId="{3BBFCE26-90B9-E10B-3603-FAC5522D4094}"/>
+          </ac:spMkLst>
+        </pc:spChg>
+        <pc:spChg chg="del">
+          <ac:chgData name="Matthew Dodds" userId="80d5a6ea92063750" providerId="LiveId" clId="{614D3421-716A-4CB0-994B-C24DF82A0F6F}" dt="2025-12-08T06:26:42.531" v="416" actId="478"/>
+          <ac:spMkLst>
+            <pc:docMk/>
+            <pc:sldMk cId="4264677433" sldId="281"/>
+            <ac:spMk id="13" creationId="{D0EB1575-6CED-2B26-FCE7-82EDD1BD56AE}"/>
+          </ac:spMkLst>
+        </pc:spChg>
+        <pc:spChg chg="del">
+          <ac:chgData name="Matthew Dodds" userId="80d5a6ea92063750" providerId="LiveId" clId="{614D3421-716A-4CB0-994B-C24DF82A0F6F}" dt="2025-12-08T06:26:42.531" v="416" actId="478"/>
+          <ac:spMkLst>
+            <pc:docMk/>
+            <pc:sldMk cId="4264677433" sldId="281"/>
+            <ac:spMk id="17" creationId="{37BE46B2-E14A-BA94-7B0F-4571843014EE}"/>
+          </ac:spMkLst>
+        </pc:spChg>
+        <pc:spChg chg="del">
+          <ac:chgData name="Matthew Dodds" userId="80d5a6ea92063750" providerId="LiveId" clId="{614D3421-716A-4CB0-994B-C24DF82A0F6F}" dt="2025-12-08T06:26:42.531" v="416" actId="478"/>
+          <ac:spMkLst>
+            <pc:docMk/>
+            <pc:sldMk cId="4264677433" sldId="281"/>
+            <ac:spMk id="18" creationId="{B5B0A061-1458-B0F3-3E15-4FAD54B7EA9C}"/>
+          </ac:spMkLst>
+        </pc:spChg>
+        <pc:grpChg chg="del">
+          <ac:chgData name="Matthew Dodds" userId="80d5a6ea92063750" providerId="LiveId" clId="{614D3421-716A-4CB0-994B-C24DF82A0F6F}" dt="2025-12-08T06:26:42.531" v="416" actId="478"/>
+          <ac:grpSpMkLst>
+            <pc:docMk/>
+            <pc:sldMk cId="4264677433" sldId="281"/>
+            <ac:grpSpMk id="14" creationId="{E007DC9F-9DE8-786D-D1FE-53D73902C64D}"/>
+          </ac:grpSpMkLst>
+        </pc:grpChg>
       </pc:sldChg>
     </pc:docChg>
   </pc:docChgLst>
@@ -436,7 +907,7 @@
           <a:p>
             <a:fld id="{C6844EAE-78C4-45F3-83C5-DF449BFC3B16}" type="datetimeFigureOut">
               <a:rPr lang="en-GB" smtClean="0"/>
-              <a:t>06/12/2025</a:t>
+              <a:t>08/12/2025</a:t>
             </a:fld>
             <a:endParaRPr lang="en-GB"/>
           </a:p>
@@ -606,7 +1077,7 @@
           <a:p>
             <a:fld id="{C6844EAE-78C4-45F3-83C5-DF449BFC3B16}" type="datetimeFigureOut">
               <a:rPr lang="en-GB" smtClean="0"/>
-              <a:t>06/12/2025</a:t>
+              <a:t>08/12/2025</a:t>
             </a:fld>
             <a:endParaRPr lang="en-GB"/>
           </a:p>
@@ -786,7 +1257,7 @@
           <a:p>
             <a:fld id="{C6844EAE-78C4-45F3-83C5-DF449BFC3B16}" type="datetimeFigureOut">
               <a:rPr lang="en-GB" smtClean="0"/>
-              <a:t>06/12/2025</a:t>
+              <a:t>08/12/2025</a:t>
             </a:fld>
             <a:endParaRPr lang="en-GB"/>
           </a:p>
@@ -956,7 +1427,7 @@
           <a:p>
             <a:fld id="{C6844EAE-78C4-45F3-83C5-DF449BFC3B16}" type="datetimeFigureOut">
               <a:rPr lang="en-GB" smtClean="0"/>
-              <a:t>06/12/2025</a:t>
+              <a:t>08/12/2025</a:t>
             </a:fld>
             <a:endParaRPr lang="en-GB"/>
           </a:p>
@@ -1202,7 +1673,7 @@
           <a:p>
             <a:fld id="{C6844EAE-78C4-45F3-83C5-DF449BFC3B16}" type="datetimeFigureOut">
               <a:rPr lang="en-GB" smtClean="0"/>
-              <a:t>06/12/2025</a:t>
+              <a:t>08/12/2025</a:t>
             </a:fld>
             <a:endParaRPr lang="en-GB"/>
           </a:p>
@@ -1434,7 +1905,7 @@
           <a:p>
             <a:fld id="{C6844EAE-78C4-45F3-83C5-DF449BFC3B16}" type="datetimeFigureOut">
               <a:rPr lang="en-GB" smtClean="0"/>
-              <a:t>06/12/2025</a:t>
+              <a:t>08/12/2025</a:t>
             </a:fld>
             <a:endParaRPr lang="en-GB"/>
           </a:p>
@@ -1801,7 +2272,7 @@
           <a:p>
             <a:fld id="{C6844EAE-78C4-45F3-83C5-DF449BFC3B16}" type="datetimeFigureOut">
               <a:rPr lang="en-GB" smtClean="0"/>
-              <a:t>06/12/2025</a:t>
+              <a:t>08/12/2025</a:t>
             </a:fld>
             <a:endParaRPr lang="en-GB"/>
           </a:p>
@@ -1919,7 +2390,7 @@
           <a:p>
             <a:fld id="{C6844EAE-78C4-45F3-83C5-DF449BFC3B16}" type="datetimeFigureOut">
               <a:rPr lang="en-GB" smtClean="0"/>
-              <a:t>06/12/2025</a:t>
+              <a:t>08/12/2025</a:t>
             </a:fld>
             <a:endParaRPr lang="en-GB"/>
           </a:p>
@@ -2014,7 +2485,7 @@
           <a:p>
             <a:fld id="{C6844EAE-78C4-45F3-83C5-DF449BFC3B16}" type="datetimeFigureOut">
               <a:rPr lang="en-GB" smtClean="0"/>
-              <a:t>06/12/2025</a:t>
+              <a:t>08/12/2025</a:t>
             </a:fld>
             <a:endParaRPr lang="en-GB"/>
           </a:p>
@@ -2291,7 +2762,7 @@
           <a:p>
             <a:fld id="{C6844EAE-78C4-45F3-83C5-DF449BFC3B16}" type="datetimeFigureOut">
               <a:rPr lang="en-GB" smtClean="0"/>
-              <a:t>06/12/2025</a:t>
+              <a:t>08/12/2025</a:t>
             </a:fld>
             <a:endParaRPr lang="en-GB"/>
           </a:p>
@@ -2548,7 +3019,7 @@
           <a:p>
             <a:fld id="{C6844EAE-78C4-45F3-83C5-DF449BFC3B16}" type="datetimeFigureOut">
               <a:rPr lang="en-GB" smtClean="0"/>
-              <a:t>06/12/2025</a:t>
+              <a:t>08/12/2025</a:t>
             </a:fld>
             <a:endParaRPr lang="en-GB"/>
           </a:p>
@@ -2780,7 +3251,7 @@
           <a:p>
             <a:fld id="{C6844EAE-78C4-45F3-83C5-DF449BFC3B16}" type="datetimeFigureOut">
               <a:rPr lang="en-GB" smtClean="0"/>
-              <a:t>06/12/2025</a:t>
+              <a:t>08/12/2025</a:t>
             </a:fld>
             <a:endParaRPr lang="en-GB"/>
           </a:p>
@@ -3176,7 +3647,7 @@
         <p:cNvPr id="1" name="">
           <a:extLst>
             <a:ext uri="{FF2B5EF4-FFF2-40B4-BE49-F238E27FC236}">
-              <a16:creationId xmlns:a16="http://schemas.microsoft.com/office/drawing/2014/main" id="{A28B9404-181B-B956-EAEB-342BC7431A89}"/>
+              <a16:creationId xmlns:a16="http://schemas.microsoft.com/office/drawing/2014/main" id="{FC008461-F6F4-567F-E232-BFA99D7E6EB9}"/>
             </a:ext>
           </a:extLst>
         </p:cNvPr>
@@ -3196,7 +3667,7 @@
           <p:cNvPr id="2" name="TextBox 1">
             <a:extLst>
               <a:ext uri="{FF2B5EF4-FFF2-40B4-BE49-F238E27FC236}">
-                <a16:creationId xmlns:a16="http://schemas.microsoft.com/office/drawing/2014/main" id="{733AFC69-F7A5-5694-E479-4D623FD269ED}"/>
+                <a16:creationId xmlns:a16="http://schemas.microsoft.com/office/drawing/2014/main" id="{41EAEE44-A988-9902-12A5-AF84E2BF0B61}"/>
               </a:ext>
             </a:extLst>
           </p:cNvPr>
@@ -3205,8 +3676,8 @@
         </p:nvSpPr>
         <p:spPr>
           <a:xfrm>
-            <a:off x="2043894" y="1975030"/>
-            <a:ext cx="3223574" cy="523220"/>
+            <a:off x="2167089" y="1900454"/>
+            <a:ext cx="3935442" cy="707886"/>
           </a:xfrm>
           <a:prstGeom prst="rect">
             <a:avLst/>
@@ -3220,7 +3691,7 @@
           <a:lstStyle/>
           <a:p>
             <a:r>
-              <a:rPr lang="en-GB" sz="1400" spc="300" dirty="0">
+              <a:rPr lang="en-GB" sz="2000" spc="300" dirty="0">
                 <a:solidFill>
                   <a:schemeClr val="bg1">
                     <a:lumMod val="95000"/>
@@ -3247,7 +3718,7 @@
           <p:cNvPr id="4" name="Rectangle: Rounded Corners 3">
             <a:extLst>
               <a:ext uri="{FF2B5EF4-FFF2-40B4-BE49-F238E27FC236}">
-                <a16:creationId xmlns:a16="http://schemas.microsoft.com/office/drawing/2014/main" id="{09E29F80-AB15-304A-A0EC-4E5C69454E48}"/>
+                <a16:creationId xmlns:a16="http://schemas.microsoft.com/office/drawing/2014/main" id="{4C461C13-75C0-DA41-F556-7E87F17199B5}"/>
               </a:ext>
             </a:extLst>
           </p:cNvPr>
@@ -3256,8 +3727,8 @@
         </p:nvSpPr>
         <p:spPr>
           <a:xfrm>
-            <a:off x="929469" y="1383825"/>
-            <a:ext cx="1114425" cy="1152525"/>
+            <a:off x="936000" y="1289792"/>
+            <a:ext cx="1231089" cy="1214536"/>
           </a:xfrm>
           <a:prstGeom prst="roundRect">
             <a:avLst/>
@@ -3300,7 +3771,7 @@
           <a:lstStyle/>
           <a:p>
             <a:pPr algn="ctr"/>
-            <a:endParaRPr lang="en-GB"/>
+            <a:endParaRPr lang="en-GB" dirty="0"/>
           </a:p>
         </p:txBody>
       </p:sp>
@@ -3309,7 +3780,7 @@
           <p:cNvPr id="5" name="TextBox 4">
             <a:extLst>
               <a:ext uri="{FF2B5EF4-FFF2-40B4-BE49-F238E27FC236}">
-                <a16:creationId xmlns:a16="http://schemas.microsoft.com/office/drawing/2014/main" id="{F51AB63F-E4EB-FAA6-439C-0B270A2BEEAD}"/>
+                <a16:creationId xmlns:a16="http://schemas.microsoft.com/office/drawing/2014/main" id="{4474B01D-8AA5-0F52-ACED-BFD4BD6F3DD3}"/>
               </a:ext>
             </a:extLst>
           </p:cNvPr>
@@ -3318,8 +3789,8 @@
         </p:nvSpPr>
         <p:spPr>
           <a:xfrm>
-            <a:off x="2043894" y="5545226"/>
-            <a:ext cx="3223574" cy="276999"/>
+            <a:off x="2167089" y="4071794"/>
+            <a:ext cx="3223574" cy="369332"/>
           </a:xfrm>
           <a:prstGeom prst="rect">
             <a:avLst/>
@@ -3333,6 +3804,26 @@
           <a:lstStyle/>
           <a:p>
             <a:r>
+              <a:rPr lang="en-GB" spc="300" dirty="0">
+                <a:solidFill>
+                  <a:schemeClr val="bg1">
+                    <a:lumMod val="95000"/>
+                  </a:schemeClr>
+                </a:solidFill>
+                <a:effectLst>
+                  <a:outerShdw blurRad="38100" dist="38100" dir="2700000" algn="tl">
+                    <a:srgbClr val="D65700">
+                      <a:alpha val="43000"/>
+                    </a:srgbClr>
+                  </a:outerShdw>
+                </a:effectLst>
+                <a:latin typeface="Candara" panose="020E0502030303020204" pitchFamily="34" charset="0"/>
+                <a:ea typeface="Cascadia Code" panose="020B0609020000020004" pitchFamily="49" charset="0"/>
+                <a:cs typeface="Cascadia Code" panose="020B0609020000020004" pitchFamily="49" charset="0"/>
+              </a:rPr>
+              <a:t>LOGIN</a:t>
+            </a:r>
+            <a:r>
               <a:rPr lang="en-GB" sz="1200" spc="300" dirty="0">
                 <a:solidFill>
                   <a:schemeClr val="bg1">
@@ -3341,8 +3832,8 @@
                 </a:solidFill>
                 <a:effectLst>
                   <a:outerShdw blurRad="38100" dist="38100" dir="2700000" algn="tl">
-                    <a:srgbClr val="000000">
-                      <a:alpha val="43137"/>
+                    <a:srgbClr val="D65700">
+                      <a:alpha val="43000"/>
                     </a:srgbClr>
                   </a:outerShdw>
                 </a:effectLst>
@@ -3350,7 +3841,7 @@
                 <a:ea typeface="Cascadia Code" panose="020B0609020000020004" pitchFamily="49" charset="0"/>
                 <a:cs typeface="Cascadia Code" panose="020B0609020000020004" pitchFamily="49" charset="0"/>
               </a:rPr>
-              <a:t>LOGIN: </a:t>
+              <a:t>: </a:t>
             </a:r>
           </a:p>
         </p:txBody>
@@ -3360,7 +3851,7 @@
           <p:cNvPr id="3" name="Straight Connector 2">
             <a:extLst>
               <a:ext uri="{FF2B5EF4-FFF2-40B4-BE49-F238E27FC236}">
-                <a16:creationId xmlns:a16="http://schemas.microsoft.com/office/drawing/2014/main" id="{56556E3C-89EC-6FCC-7743-75E1D26DA8A0}"/>
+                <a16:creationId xmlns:a16="http://schemas.microsoft.com/office/drawing/2014/main" id="{91D13D3B-03C3-660E-3B9B-364754BFB2E6}"/>
               </a:ext>
             </a:extLst>
           </p:cNvPr>
@@ -3370,9 +3861,9 @@
           <p:nvPr/>
         </p:nvCxnSpPr>
         <p:spPr>
-          <a:xfrm flipV="1">
-            <a:off x="2143125" y="2454347"/>
-            <a:ext cx="9740040" cy="37078"/>
+          <a:xfrm>
+            <a:off x="936000" y="2589090"/>
+            <a:ext cx="10333062" cy="0"/>
           </a:xfrm>
           <a:prstGeom prst="line">
             <a:avLst/>
@@ -3417,6 +3908,808 @@
     </p:spTree>
     <p:extLst>
       <p:ext uri="{BB962C8B-B14F-4D97-AF65-F5344CB8AC3E}">
+        <p14:creationId xmlns:p14="http://schemas.microsoft.com/office/powerpoint/2010/main" val="4264677433"/>
+      </p:ext>
+    </p:extLst>
+  </p:cSld>
+  <p:clrMapOvr>
+    <a:masterClrMapping/>
+  </p:clrMapOvr>
+</p:sld>
+</file>
+
+<file path=ppt/slides/slide2.xml><?xml version="1.0" encoding="utf-8"?>
+<p:sld xmlns:a="http://schemas.openxmlformats.org/drawingml/2006/main" xmlns:r="http://schemas.openxmlformats.org/officeDocument/2006/relationships" xmlns:p="http://schemas.openxmlformats.org/presentationml/2006/main">
+  <p:cSld>
+    <p:spTree>
+      <p:nvGrpSpPr>
+        <p:cNvPr id="1" name="">
+          <a:extLst>
+            <a:ext uri="{FF2B5EF4-FFF2-40B4-BE49-F238E27FC236}">
+              <a16:creationId xmlns:a16="http://schemas.microsoft.com/office/drawing/2014/main" id="{A28B9404-181B-B956-EAEB-342BC7431A89}"/>
+            </a:ext>
+          </a:extLst>
+        </p:cNvPr>
+        <p:cNvGrpSpPr/>
+        <p:nvPr/>
+      </p:nvGrpSpPr>
+      <p:grpSpPr>
+        <a:xfrm>
+          <a:off x="0" y="0"/>
+          <a:ext cx="0" cy="0"/>
+          <a:chOff x="0" y="0"/>
+          <a:chExt cx="0" cy="0"/>
+        </a:xfrm>
+      </p:grpSpPr>
+      <p:sp>
+        <p:nvSpPr>
+          <p:cNvPr id="2" name="TextBox 1">
+            <a:extLst>
+              <a:ext uri="{FF2B5EF4-FFF2-40B4-BE49-F238E27FC236}">
+                <a16:creationId xmlns:a16="http://schemas.microsoft.com/office/drawing/2014/main" id="{733AFC69-F7A5-5694-E479-4D623FD269ED}"/>
+              </a:ext>
+            </a:extLst>
+          </p:cNvPr>
+          <p:cNvSpPr txBox="1"/>
+          <p:nvPr/>
+        </p:nvSpPr>
+        <p:spPr>
+          <a:xfrm>
+            <a:off x="2167089" y="1900454"/>
+            <a:ext cx="3935442" cy="707886"/>
+          </a:xfrm>
+          <a:prstGeom prst="rect">
+            <a:avLst/>
+          </a:prstGeom>
+          <a:noFill/>
+        </p:spPr>
+        <p:txBody>
+          <a:bodyPr wrap="square" rtlCol="0">
+            <a:spAutoFit/>
+          </a:bodyPr>
+          <a:lstStyle/>
+          <a:p>
+            <a:r>
+              <a:rPr lang="en-GB" sz="2000" spc="300" dirty="0">
+                <a:solidFill>
+                  <a:schemeClr val="bg1">
+                    <a:lumMod val="95000"/>
+                  </a:schemeClr>
+                </a:solidFill>
+                <a:effectLst>
+                  <a:outerShdw blurRad="38100" dist="38100" dir="2700000" algn="tl">
+                    <a:srgbClr val="000000">
+                      <a:alpha val="43137"/>
+                    </a:srgbClr>
+                  </a:outerShdw>
+                </a:effectLst>
+                <a:latin typeface="Candara" panose="020E0502030303020204" pitchFamily="34" charset="0"/>
+                <a:ea typeface="Cascadia Code" panose="020B0609020000020004" pitchFamily="49" charset="0"/>
+                <a:cs typeface="Cascadia Code" panose="020B0609020000020004" pitchFamily="49" charset="0"/>
+              </a:rPr>
+              <a:t>PROMETHEUS COURSE GENERATION SYSTEM 2.0</a:t>
+            </a:r>
+          </a:p>
+        </p:txBody>
+      </p:sp>
+      <p:sp>
+        <p:nvSpPr>
+          <p:cNvPr id="4" name="Rectangle: Rounded Corners 3">
+            <a:extLst>
+              <a:ext uri="{FF2B5EF4-FFF2-40B4-BE49-F238E27FC236}">
+                <a16:creationId xmlns:a16="http://schemas.microsoft.com/office/drawing/2014/main" id="{09E29F80-AB15-304A-A0EC-4E5C69454E48}"/>
+              </a:ext>
+            </a:extLst>
+          </p:cNvPr>
+          <p:cNvSpPr/>
+          <p:nvPr/>
+        </p:nvSpPr>
+        <p:spPr>
+          <a:xfrm>
+            <a:off x="936000" y="1289792"/>
+            <a:ext cx="1231089" cy="1214536"/>
+          </a:xfrm>
+          <a:prstGeom prst="roundRect">
+            <a:avLst/>
+          </a:prstGeom>
+          <a:blipFill>
+            <a:blip r:embed="rId2"/>
+            <a:stretch>
+              <a:fillRect/>
+            </a:stretch>
+          </a:blipFill>
+          <a:ln>
+            <a:noFill/>
+          </a:ln>
+          <a:scene3d>
+            <a:camera prst="orthographicFront"/>
+            <a:lightRig rig="threePt" dir="t"/>
+          </a:scene3d>
+          <a:sp3d>
+            <a:bevelT/>
+          </a:sp3d>
+        </p:spPr>
+        <p:style>
+          <a:lnRef idx="2">
+            <a:schemeClr val="accent1">
+              <a:shade val="15000"/>
+            </a:schemeClr>
+          </a:lnRef>
+          <a:fillRef idx="1">
+            <a:schemeClr val="accent1"/>
+          </a:fillRef>
+          <a:effectRef idx="0">
+            <a:schemeClr val="accent1"/>
+          </a:effectRef>
+          <a:fontRef idx="minor">
+            <a:schemeClr val="lt1"/>
+          </a:fontRef>
+        </p:style>
+        <p:txBody>
+          <a:bodyPr rtlCol="0" anchor="ctr"/>
+          <a:lstStyle/>
+          <a:p>
+            <a:pPr algn="ctr"/>
+            <a:endParaRPr lang="en-GB" dirty="0"/>
+          </a:p>
+        </p:txBody>
+      </p:sp>
+      <p:sp>
+        <p:nvSpPr>
+          <p:cNvPr id="5" name="TextBox 4">
+            <a:extLst>
+              <a:ext uri="{FF2B5EF4-FFF2-40B4-BE49-F238E27FC236}">
+                <a16:creationId xmlns:a16="http://schemas.microsoft.com/office/drawing/2014/main" id="{F51AB63F-E4EB-FAA6-439C-0B270A2BEEAD}"/>
+              </a:ext>
+            </a:extLst>
+          </p:cNvPr>
+          <p:cNvSpPr txBox="1"/>
+          <p:nvPr/>
+        </p:nvSpPr>
+        <p:spPr>
+          <a:xfrm>
+            <a:off x="2167089" y="4071794"/>
+            <a:ext cx="3223574" cy="369332"/>
+          </a:xfrm>
+          <a:prstGeom prst="rect">
+            <a:avLst/>
+          </a:prstGeom>
+          <a:noFill/>
+        </p:spPr>
+        <p:txBody>
+          <a:bodyPr wrap="square" rtlCol="0">
+            <a:spAutoFit/>
+          </a:bodyPr>
+          <a:lstStyle/>
+          <a:p>
+            <a:r>
+              <a:rPr lang="en-GB" spc="300" dirty="0">
+                <a:solidFill>
+                  <a:schemeClr val="bg1">
+                    <a:lumMod val="95000"/>
+                  </a:schemeClr>
+                </a:solidFill>
+                <a:effectLst>
+                  <a:outerShdw blurRad="38100" dist="38100" dir="2700000" algn="tl">
+                    <a:srgbClr val="000000">
+                      <a:alpha val="43137"/>
+                    </a:srgbClr>
+                  </a:outerShdw>
+                </a:effectLst>
+                <a:latin typeface="Candara" panose="020E0502030303020204" pitchFamily="34" charset="0"/>
+                <a:ea typeface="Cascadia Code" panose="020B0609020000020004" pitchFamily="49" charset="0"/>
+                <a:cs typeface="Cascadia Code" panose="020B0609020000020004" pitchFamily="49" charset="0"/>
+              </a:rPr>
+              <a:t>LOGIN</a:t>
+            </a:r>
+            <a:r>
+              <a:rPr lang="en-GB" sz="1200" spc="300" dirty="0">
+                <a:solidFill>
+                  <a:schemeClr val="bg1">
+                    <a:lumMod val="95000"/>
+                  </a:schemeClr>
+                </a:solidFill>
+                <a:effectLst>
+                  <a:outerShdw blurRad="38100" dist="38100" dir="2700000" algn="tl">
+                    <a:srgbClr val="000000">
+                      <a:alpha val="43137"/>
+                    </a:srgbClr>
+                  </a:outerShdw>
+                </a:effectLst>
+                <a:latin typeface="Cascadia Code" panose="020B0609020000020004" pitchFamily="49" charset="0"/>
+                <a:ea typeface="Cascadia Code" panose="020B0609020000020004" pitchFamily="49" charset="0"/>
+                <a:cs typeface="Cascadia Code" panose="020B0609020000020004" pitchFamily="49" charset="0"/>
+              </a:rPr>
+              <a:t>: </a:t>
+            </a:r>
+          </a:p>
+        </p:txBody>
+      </p:sp>
+      <p:cxnSp>
+        <p:nvCxnSpPr>
+          <p:cNvPr id="3" name="Straight Connector 2">
+            <a:extLst>
+              <a:ext uri="{FF2B5EF4-FFF2-40B4-BE49-F238E27FC236}">
+                <a16:creationId xmlns:a16="http://schemas.microsoft.com/office/drawing/2014/main" id="{56556E3C-89EC-6FCC-7743-75E1D26DA8A0}"/>
+              </a:ext>
+            </a:extLst>
+          </p:cNvPr>
+          <p:cNvCxnSpPr>
+            <a:cxnSpLocks/>
+          </p:cNvCxnSpPr>
+          <p:nvPr/>
+        </p:nvCxnSpPr>
+        <p:spPr>
+          <a:xfrm>
+            <a:off x="936000" y="2589090"/>
+            <a:ext cx="10333062" cy="0"/>
+          </a:xfrm>
+          <a:prstGeom prst="line">
+            <a:avLst/>
+          </a:prstGeom>
+          <a:ln w="9525">
+            <a:gradFill flip="none" rotWithShape="1">
+              <a:gsLst>
+                <a:gs pos="0">
+                  <a:schemeClr val="bg1"/>
+                </a:gs>
+                <a:gs pos="85000">
+                  <a:schemeClr val="bg2">
+                    <a:lumMod val="50000"/>
+                  </a:schemeClr>
+                </a:gs>
+                <a:gs pos="100000">
+                  <a:schemeClr val="bg2">
+                    <a:lumMod val="25000"/>
+                  </a:schemeClr>
+                </a:gs>
+              </a:gsLst>
+              <a:lin ang="13500000" scaled="1"/>
+              <a:tileRect/>
+            </a:gradFill>
+          </a:ln>
+        </p:spPr>
+        <p:style>
+          <a:lnRef idx="2">
+            <a:schemeClr val="accent1"/>
+          </a:lnRef>
+          <a:fillRef idx="0">
+            <a:schemeClr val="accent1"/>
+          </a:fillRef>
+          <a:effectRef idx="1">
+            <a:schemeClr val="accent1"/>
+          </a:effectRef>
+          <a:fontRef idx="minor">
+            <a:schemeClr val="tx1"/>
+          </a:fontRef>
+        </p:style>
+      </p:cxnSp>
+      <p:sp>
+        <p:nvSpPr>
+          <p:cNvPr id="10" name="TextBox 9">
+            <a:extLst>
+              <a:ext uri="{FF2B5EF4-FFF2-40B4-BE49-F238E27FC236}">
+                <a16:creationId xmlns:a16="http://schemas.microsoft.com/office/drawing/2014/main" id="{18D8A8E8-C6E2-E267-08D3-8ECF430B341D}"/>
+              </a:ext>
+            </a:extLst>
+          </p:cNvPr>
+          <p:cNvSpPr txBox="1"/>
+          <p:nvPr/>
+        </p:nvSpPr>
+        <p:spPr>
+          <a:xfrm>
+            <a:off x="3925126" y="4132715"/>
+            <a:ext cx="873005" cy="215444"/>
+          </a:xfrm>
+          <a:prstGeom prst="rect">
+            <a:avLst/>
+          </a:prstGeom>
+          <a:noFill/>
+          <a:effectLst/>
+        </p:spPr>
+        <p:txBody>
+          <a:bodyPr wrap="square" rtlCol="0">
+            <a:spAutoFit/>
+          </a:bodyPr>
+          <a:lstStyle/>
+          <a:p>
+            <a:r>
+              <a:rPr lang="en-GB" sz="800" spc="150" dirty="0">
+                <a:solidFill>
+                  <a:schemeClr val="bg1">
+                    <a:lumMod val="95000"/>
+                  </a:schemeClr>
+                </a:solidFill>
+                <a:effectLst/>
+                <a:latin typeface="Candara" panose="020E0502030303020204" pitchFamily="34" charset="0"/>
+                <a:ea typeface="Cascadia Code" panose="020B0609020000020004" pitchFamily="49" charset="0"/>
+                <a:cs typeface="Cascadia Code" panose="020B0609020000020004" pitchFamily="49" charset="0"/>
+              </a:rPr>
+              <a:t>USERNAME</a:t>
+            </a:r>
+          </a:p>
+        </p:txBody>
+      </p:sp>
+      <p:sp>
+        <p:nvSpPr>
+          <p:cNvPr id="11" name="Rectangle: Rounded Corners 10">
+            <a:extLst>
+              <a:ext uri="{FF2B5EF4-FFF2-40B4-BE49-F238E27FC236}">
+                <a16:creationId xmlns:a16="http://schemas.microsoft.com/office/drawing/2014/main" id="{0A1F18CA-665A-927D-1031-82750E4ADC11}"/>
+              </a:ext>
+            </a:extLst>
+          </p:cNvPr>
+          <p:cNvSpPr/>
+          <p:nvPr/>
+        </p:nvSpPr>
+        <p:spPr>
+          <a:xfrm>
+            <a:off x="4798131" y="4119754"/>
+            <a:ext cx="3039308" cy="261609"/>
+          </a:xfrm>
+          <a:prstGeom prst="roundRect">
+            <a:avLst>
+              <a:gd name="adj" fmla="val 6336"/>
+            </a:avLst>
+          </a:prstGeom>
+          <a:noFill/>
+          <a:ln w="6350" cap="sq">
+            <a:gradFill flip="none" rotWithShape="1">
+              <a:gsLst>
+                <a:gs pos="0">
+                  <a:schemeClr val="accent5">
+                    <a:lumMod val="0"/>
+                    <a:lumOff val="100000"/>
+                  </a:schemeClr>
+                </a:gs>
+                <a:gs pos="21000">
+                  <a:schemeClr val="accent5">
+                    <a:lumMod val="0"/>
+                    <a:lumOff val="100000"/>
+                  </a:schemeClr>
+                </a:gs>
+                <a:gs pos="100000">
+                  <a:schemeClr val="bg2">
+                    <a:lumMod val="50000"/>
+                  </a:schemeClr>
+                </a:gs>
+              </a:gsLst>
+              <a:path path="circle">
+                <a:fillToRect l="50000" t="50000" r="50000" b="50000"/>
+              </a:path>
+              <a:tileRect/>
+            </a:gradFill>
+            <a:round/>
+          </a:ln>
+        </p:spPr>
+        <p:style>
+          <a:lnRef idx="2">
+            <a:schemeClr val="accent1">
+              <a:shade val="15000"/>
+            </a:schemeClr>
+          </a:lnRef>
+          <a:fillRef idx="1">
+            <a:schemeClr val="accent1"/>
+          </a:fillRef>
+          <a:effectRef idx="0">
+            <a:schemeClr val="accent1"/>
+          </a:effectRef>
+          <a:fontRef idx="minor">
+            <a:schemeClr val="lt1"/>
+          </a:fontRef>
+        </p:style>
+        <p:txBody>
+          <a:bodyPr rtlCol="0" anchor="ctr"/>
+          <a:lstStyle/>
+          <a:p>
+            <a:pPr algn="ctr"/>
+            <a:endParaRPr lang="en-GB" dirty="0">
+              <a:latin typeface="Candara" panose="020E0502030303020204" pitchFamily="34" charset="0"/>
+            </a:endParaRPr>
+          </a:p>
+        </p:txBody>
+      </p:sp>
+      <p:sp>
+        <p:nvSpPr>
+          <p:cNvPr id="12" name="TextBox 11">
+            <a:extLst>
+              <a:ext uri="{FF2B5EF4-FFF2-40B4-BE49-F238E27FC236}">
+                <a16:creationId xmlns:a16="http://schemas.microsoft.com/office/drawing/2014/main" id="{532ACE2D-71D2-4B47-3687-0ECAF8DADDC6}"/>
+              </a:ext>
+            </a:extLst>
+          </p:cNvPr>
+          <p:cNvSpPr txBox="1"/>
+          <p:nvPr/>
+        </p:nvSpPr>
+        <p:spPr>
+          <a:xfrm>
+            <a:off x="3925126" y="4564247"/>
+            <a:ext cx="873005" cy="215444"/>
+          </a:xfrm>
+          <a:prstGeom prst="rect">
+            <a:avLst/>
+          </a:prstGeom>
+          <a:noFill/>
+          <a:effectLst/>
+        </p:spPr>
+        <p:txBody>
+          <a:bodyPr wrap="square" rtlCol="0">
+            <a:spAutoFit/>
+          </a:bodyPr>
+          <a:lstStyle/>
+          <a:p>
+            <a:r>
+              <a:rPr lang="en-GB" sz="800" spc="150" dirty="0">
+                <a:solidFill>
+                  <a:schemeClr val="bg1">
+                    <a:lumMod val="95000"/>
+                  </a:schemeClr>
+                </a:solidFill>
+                <a:effectLst/>
+                <a:latin typeface="Candara" panose="020E0502030303020204" pitchFamily="34" charset="0"/>
+                <a:ea typeface="Cascadia Code" panose="020B0609020000020004" pitchFamily="49" charset="0"/>
+                <a:cs typeface="Cascadia Code" panose="020B0609020000020004" pitchFamily="49" charset="0"/>
+              </a:rPr>
+              <a:t>PASSWORD</a:t>
+            </a:r>
+          </a:p>
+        </p:txBody>
+      </p:sp>
+      <p:sp>
+        <p:nvSpPr>
+          <p:cNvPr id="13" name="Rectangle: Rounded Corners 12">
+            <a:extLst>
+              <a:ext uri="{FF2B5EF4-FFF2-40B4-BE49-F238E27FC236}">
+                <a16:creationId xmlns:a16="http://schemas.microsoft.com/office/drawing/2014/main" id="{0A75EA01-C642-DB0B-3FA2-EAE8F28D7B82}"/>
+              </a:ext>
+            </a:extLst>
+          </p:cNvPr>
+          <p:cNvSpPr/>
+          <p:nvPr/>
+        </p:nvSpPr>
+        <p:spPr>
+          <a:xfrm>
+            <a:off x="4798131" y="4551286"/>
+            <a:ext cx="3039308" cy="261609"/>
+          </a:xfrm>
+          <a:prstGeom prst="roundRect">
+            <a:avLst>
+              <a:gd name="adj" fmla="val 6336"/>
+            </a:avLst>
+          </a:prstGeom>
+          <a:noFill/>
+          <a:ln w="6350" cap="sq">
+            <a:gradFill flip="none" rotWithShape="1">
+              <a:gsLst>
+                <a:gs pos="0">
+                  <a:schemeClr val="accent5">
+                    <a:lumMod val="0"/>
+                    <a:lumOff val="100000"/>
+                  </a:schemeClr>
+                </a:gs>
+                <a:gs pos="21000">
+                  <a:schemeClr val="accent5">
+                    <a:lumMod val="0"/>
+                    <a:lumOff val="100000"/>
+                  </a:schemeClr>
+                </a:gs>
+                <a:gs pos="100000">
+                  <a:schemeClr val="bg2">
+                    <a:lumMod val="50000"/>
+                  </a:schemeClr>
+                </a:gs>
+              </a:gsLst>
+              <a:path path="circle">
+                <a:fillToRect l="50000" t="50000" r="50000" b="50000"/>
+              </a:path>
+              <a:tileRect/>
+            </a:gradFill>
+            <a:round/>
+          </a:ln>
+        </p:spPr>
+        <p:style>
+          <a:lnRef idx="2">
+            <a:schemeClr val="accent1">
+              <a:shade val="15000"/>
+            </a:schemeClr>
+          </a:lnRef>
+          <a:fillRef idx="1">
+            <a:schemeClr val="accent1"/>
+          </a:fillRef>
+          <a:effectRef idx="0">
+            <a:schemeClr val="accent1"/>
+          </a:effectRef>
+          <a:fontRef idx="minor">
+            <a:schemeClr val="lt1"/>
+          </a:fontRef>
+        </p:style>
+        <p:txBody>
+          <a:bodyPr rtlCol="0" anchor="ctr"/>
+          <a:lstStyle/>
+          <a:p>
+            <a:pPr algn="ctr"/>
+            <a:endParaRPr lang="en-GB">
+              <a:latin typeface="Candara" panose="020E0502030303020204" pitchFamily="34" charset="0"/>
+            </a:endParaRPr>
+          </a:p>
+        </p:txBody>
+      </p:sp>
+      <p:grpSp>
+        <p:nvGrpSpPr>
+          <p:cNvPr id="14" name="Group 13">
+            <a:extLst>
+              <a:ext uri="{FF2B5EF4-FFF2-40B4-BE49-F238E27FC236}">
+                <a16:creationId xmlns:a16="http://schemas.microsoft.com/office/drawing/2014/main" id="{8EA7D2FE-1EDC-540D-53FC-A64633FD50E0}"/>
+              </a:ext>
+            </a:extLst>
+          </p:cNvPr>
+          <p:cNvGrpSpPr/>
+          <p:nvPr/>
+        </p:nvGrpSpPr>
+        <p:grpSpPr>
+          <a:xfrm>
+            <a:off x="4798131" y="4982818"/>
+            <a:ext cx="3039308" cy="413329"/>
+            <a:chOff x="5885838" y="3149016"/>
+            <a:chExt cx="1324587" cy="413329"/>
+          </a:xfrm>
+        </p:grpSpPr>
+        <p:sp>
+          <p:nvSpPr>
+            <p:cNvPr id="15" name="Rectangle: Rounded Corners 14">
+              <a:extLst>
+                <a:ext uri="{FF2B5EF4-FFF2-40B4-BE49-F238E27FC236}">
+                  <a16:creationId xmlns:a16="http://schemas.microsoft.com/office/drawing/2014/main" id="{35441878-7E53-61F3-968D-EE77B9019815}"/>
+                </a:ext>
+              </a:extLst>
+            </p:cNvPr>
+            <p:cNvSpPr/>
+            <p:nvPr/>
+          </p:nvSpPr>
+          <p:spPr>
+            <a:xfrm>
+              <a:off x="5885838" y="3149016"/>
+              <a:ext cx="1324587" cy="413329"/>
+            </a:xfrm>
+            <a:prstGeom prst="roundRect">
+              <a:avLst>
+                <a:gd name="adj" fmla="val 48177"/>
+              </a:avLst>
+            </a:prstGeom>
+            <a:gradFill flip="none" rotWithShape="1">
+              <a:gsLst>
+                <a:gs pos="0">
+                  <a:schemeClr val="accent5">
+                    <a:lumMod val="0"/>
+                    <a:lumOff val="100000"/>
+                  </a:schemeClr>
+                </a:gs>
+                <a:gs pos="35000">
+                  <a:srgbClr val="D65700"/>
+                </a:gs>
+                <a:gs pos="100000">
+                  <a:srgbClr val="763000"/>
+                </a:gs>
+              </a:gsLst>
+              <a:lin ang="2700000" scaled="1"/>
+              <a:tileRect/>
+            </a:gradFill>
+            <a:ln w="6350" cap="sq" cmpd="dbl">
+              <a:gradFill flip="none" rotWithShape="1">
+                <a:gsLst>
+                  <a:gs pos="0">
+                    <a:schemeClr val="accent5">
+                      <a:lumMod val="0"/>
+                      <a:lumOff val="100000"/>
+                    </a:schemeClr>
+                  </a:gs>
+                  <a:gs pos="21000">
+                    <a:schemeClr val="accent5">
+                      <a:lumMod val="0"/>
+                      <a:lumOff val="100000"/>
+                    </a:schemeClr>
+                  </a:gs>
+                  <a:gs pos="100000">
+                    <a:schemeClr val="bg2">
+                      <a:lumMod val="50000"/>
+                    </a:schemeClr>
+                  </a:gs>
+                </a:gsLst>
+                <a:path path="circle">
+                  <a:fillToRect l="50000" t="50000" r="50000" b="50000"/>
+                </a:path>
+                <a:tileRect/>
+              </a:gradFill>
+              <a:round/>
+            </a:ln>
+          </p:spPr>
+          <p:style>
+            <a:lnRef idx="2">
+              <a:schemeClr val="accent1">
+                <a:shade val="15000"/>
+              </a:schemeClr>
+            </a:lnRef>
+            <a:fillRef idx="1">
+              <a:schemeClr val="accent1"/>
+            </a:fillRef>
+            <a:effectRef idx="0">
+              <a:schemeClr val="accent1"/>
+            </a:effectRef>
+            <a:fontRef idx="minor">
+              <a:schemeClr val="lt1"/>
+            </a:fontRef>
+          </p:style>
+          <p:txBody>
+            <a:bodyPr rtlCol="0" anchor="ctr"/>
+            <a:lstStyle/>
+            <a:p>
+              <a:pPr algn="ctr"/>
+              <a:endParaRPr lang="en-GB">
+                <a:latin typeface="Candara" panose="020E0502030303020204" pitchFamily="34" charset="0"/>
+              </a:endParaRPr>
+            </a:p>
+          </p:txBody>
+        </p:sp>
+        <p:sp>
+          <p:nvSpPr>
+            <p:cNvPr id="16" name="TextBox 15">
+              <a:extLst>
+                <a:ext uri="{FF2B5EF4-FFF2-40B4-BE49-F238E27FC236}">
+                  <a16:creationId xmlns:a16="http://schemas.microsoft.com/office/drawing/2014/main" id="{F4E64D29-517B-04C2-86CE-FB3CBC9E1B36}"/>
+                </a:ext>
+              </a:extLst>
+            </p:cNvPr>
+            <p:cNvSpPr txBox="1"/>
+            <p:nvPr/>
+          </p:nvSpPr>
+          <p:spPr>
+            <a:xfrm>
+              <a:off x="6050863" y="3241868"/>
+              <a:ext cx="1035738" cy="261610"/>
+            </a:xfrm>
+            <a:prstGeom prst="rect">
+              <a:avLst/>
+            </a:prstGeom>
+            <a:noFill/>
+          </p:spPr>
+          <p:txBody>
+            <a:bodyPr wrap="square" rtlCol="0">
+              <a:spAutoFit/>
+            </a:bodyPr>
+            <a:lstStyle/>
+            <a:p>
+              <a:pPr algn="ctr"/>
+              <a:r>
+                <a:rPr lang="en-GB" sz="1100" spc="200" dirty="0">
+                  <a:solidFill>
+                    <a:schemeClr val="bg1"/>
+                  </a:solidFill>
+                  <a:latin typeface="Candara" panose="020E0502030303020204" pitchFamily="34" charset="0"/>
+                  <a:ea typeface="Cascadia Code" panose="020B0609020000020004" pitchFamily="49" charset="0"/>
+                  <a:cs typeface="Cascadia Code" panose="020B0609020000020004" pitchFamily="49" charset="0"/>
+                </a:rPr>
+                <a:t>LOGIN</a:t>
+              </a:r>
+            </a:p>
+          </p:txBody>
+        </p:sp>
+      </p:grpSp>
+      <p:sp>
+        <p:nvSpPr>
+          <p:cNvPr id="17" name="TextBox 16">
+            <a:extLst>
+              <a:ext uri="{FF2B5EF4-FFF2-40B4-BE49-F238E27FC236}">
+                <a16:creationId xmlns:a16="http://schemas.microsoft.com/office/drawing/2014/main" id="{20DCDA29-DBFE-A936-0FBA-6D2A784CF5D9}"/>
+              </a:ext>
+            </a:extLst>
+          </p:cNvPr>
+          <p:cNvSpPr txBox="1"/>
+          <p:nvPr/>
+        </p:nvSpPr>
+        <p:spPr>
+          <a:xfrm>
+            <a:off x="4694164" y="5448003"/>
+            <a:ext cx="1302375" cy="169277"/>
+          </a:xfrm>
+          <a:prstGeom prst="rect">
+            <a:avLst/>
+          </a:prstGeom>
+          <a:noFill/>
+          <a:effectLst/>
+        </p:spPr>
+        <p:txBody>
+          <a:bodyPr wrap="square" rtlCol="0">
+            <a:spAutoFit/>
+          </a:bodyPr>
+          <a:lstStyle/>
+          <a:p>
+            <a:r>
+              <a:rPr lang="en-US" sz="500" spc="150" dirty="0">
+                <a:solidFill>
+                  <a:schemeClr val="bg1">
+                    <a:lumMod val="95000"/>
+                  </a:schemeClr>
+                </a:solidFill>
+                <a:latin typeface="Candara" panose="020E0502030303020204" pitchFamily="34" charset="0"/>
+                <a:ea typeface="Cascadia Code" panose="020B0609020000020004" pitchFamily="49" charset="0"/>
+                <a:cs typeface="Cascadia Code" panose="020B0609020000020004" pitchFamily="49" charset="0"/>
+              </a:rPr>
+              <a:t>Forgot Password? </a:t>
+            </a:r>
+            <a:endParaRPr lang="en-GB" sz="800" spc="150" dirty="0">
+              <a:solidFill>
+                <a:schemeClr val="bg1">
+                  <a:lumMod val="95000"/>
+                </a:schemeClr>
+              </a:solidFill>
+              <a:effectLst/>
+              <a:latin typeface="Candara" panose="020E0502030303020204" pitchFamily="34" charset="0"/>
+              <a:ea typeface="Cascadia Code" panose="020B0609020000020004" pitchFamily="49" charset="0"/>
+              <a:cs typeface="Cascadia Code" panose="020B0609020000020004" pitchFamily="49" charset="0"/>
+            </a:endParaRPr>
+          </a:p>
+        </p:txBody>
+      </p:sp>
+      <p:sp>
+        <p:nvSpPr>
+          <p:cNvPr id="18" name="TextBox 17">
+            <a:extLst>
+              <a:ext uri="{FF2B5EF4-FFF2-40B4-BE49-F238E27FC236}">
+                <a16:creationId xmlns:a16="http://schemas.microsoft.com/office/drawing/2014/main" id="{4D899090-D990-5212-75BB-F20B1DD648FD}"/>
+              </a:ext>
+            </a:extLst>
+          </p:cNvPr>
+          <p:cNvSpPr txBox="1"/>
+          <p:nvPr/>
+        </p:nvSpPr>
+        <p:spPr>
+          <a:xfrm>
+            <a:off x="7151962" y="5460124"/>
+            <a:ext cx="802717" cy="169276"/>
+          </a:xfrm>
+          <a:prstGeom prst="rect">
+            <a:avLst/>
+          </a:prstGeom>
+          <a:noFill/>
+          <a:effectLst/>
+        </p:spPr>
+        <p:txBody>
+          <a:bodyPr wrap="square" rtlCol="0">
+            <a:spAutoFit/>
+          </a:bodyPr>
+          <a:lstStyle/>
+          <a:p>
+            <a:pPr algn="r"/>
+            <a:r>
+              <a:rPr lang="en-US" sz="500" spc="150" dirty="0">
+                <a:solidFill>
+                  <a:schemeClr val="bg1">
+                    <a:lumMod val="95000"/>
+                  </a:schemeClr>
+                </a:solidFill>
+                <a:latin typeface="Candara" panose="020E0502030303020204" pitchFamily="34" charset="0"/>
+                <a:ea typeface="Cascadia Code" panose="020B0609020000020004" pitchFamily="49" charset="0"/>
+                <a:cs typeface="Cascadia Code" panose="020B0609020000020004" pitchFamily="49" charset="0"/>
+              </a:rPr>
+              <a:t>Remember Me </a:t>
+            </a:r>
+            <a:endParaRPr lang="en-GB" sz="800" spc="150" dirty="0">
+              <a:solidFill>
+                <a:schemeClr val="bg1">
+                  <a:lumMod val="95000"/>
+                </a:schemeClr>
+              </a:solidFill>
+              <a:effectLst/>
+              <a:latin typeface="Candara" panose="020E0502030303020204" pitchFamily="34" charset="0"/>
+              <a:ea typeface="Cascadia Code" panose="020B0609020000020004" pitchFamily="49" charset="0"/>
+              <a:cs typeface="Cascadia Code" panose="020B0609020000020004" pitchFamily="49" charset="0"/>
+            </a:endParaRPr>
+          </a:p>
+        </p:txBody>
+      </p:sp>
+    </p:spTree>
+    <p:extLst>
+      <p:ext uri="{BB962C8B-B14F-4D97-AF65-F5344CB8AC3E}">
         <p14:creationId xmlns:p14="http://schemas.microsoft.com/office/powerpoint/2010/main" val="4164517435"/>
       </p:ext>
     </p:extLst>
@@ -3427,7 +4720,7 @@
 </p:sld>
 </file>
 
-<file path=ppt/slides/slide2.xml><?xml version="1.0" encoding="utf-8"?>
+<file path=ppt/slides/slide3.xml><?xml version="1.0" encoding="utf-8"?>
 <p:sld xmlns:a="http://schemas.openxmlformats.org/drawingml/2006/main" xmlns:r="http://schemas.openxmlformats.org/officeDocument/2006/relationships" xmlns:p="http://schemas.openxmlformats.org/presentationml/2006/main">
   <p:cSld>
     <p:spTree>
@@ -3571,7 +4864,7 @@
         </p:nvSpPr>
         <p:spPr>
           <a:xfrm>
-            <a:off x="10063824" y="171652"/>
+            <a:off x="5201053" y="6510071"/>
             <a:ext cx="1925430" cy="169277"/>
           </a:xfrm>
           <a:prstGeom prst="rect">
@@ -3585,7 +4878,7 @@
           </a:bodyPr>
           <a:lstStyle/>
           <a:p>
-            <a:pPr algn="r"/>
+            <a:pPr algn="ctr"/>
             <a:r>
               <a:rPr lang="en-GB" sz="500" spc="200" dirty="0">
                 <a:solidFill>
@@ -4596,245 +5889,6 @@
       </p:sp>
       <p:sp>
         <p:nvSpPr>
-          <p:cNvPr id="25" name="TextBox 24">
-            <a:extLst>
-              <a:ext uri="{FF2B5EF4-FFF2-40B4-BE49-F238E27FC236}">
-                <a16:creationId xmlns:a16="http://schemas.microsoft.com/office/drawing/2014/main" id="{88997FA6-D161-C276-ABC1-C1083E5A76AA}"/>
-              </a:ext>
-            </a:extLst>
-          </p:cNvPr>
-          <p:cNvSpPr txBox="1"/>
-          <p:nvPr/>
-        </p:nvSpPr>
-        <p:spPr>
-          <a:xfrm>
-            <a:off x="124618" y="6578595"/>
-            <a:ext cx="7567772" cy="169277"/>
-          </a:xfrm>
-          <a:prstGeom prst="rect">
-            <a:avLst/>
-          </a:prstGeom>
-          <a:noFill/>
-        </p:spPr>
-        <p:txBody>
-          <a:bodyPr wrap="square" rtlCol="0" anchor="ctr" anchorCtr="0">
-            <a:spAutoFit/>
-          </a:bodyPr>
-          <a:lstStyle/>
-          <a:p>
-            <a:r>
-              <a:rPr lang="en-GB" sz="500" spc="150" dirty="0">
-                <a:solidFill>
-                  <a:schemeClr val="bg1">
-                    <a:lumMod val="95000"/>
-                  </a:schemeClr>
-                </a:solidFill>
-                <a:effectLst>
-                  <a:outerShdw blurRad="38100" dist="38100" dir="2700000" algn="tl">
-                    <a:srgbClr val="000000">
-                      <a:alpha val="43137"/>
-                    </a:srgbClr>
-                  </a:outerShdw>
-                </a:effectLst>
-                <a:latin typeface="Cascadia Code" panose="020B0609020000020004" pitchFamily="49" charset="0"/>
-                <a:ea typeface="Cascadia Code" panose="020B0609020000020004" pitchFamily="49" charset="0"/>
-                <a:cs typeface="Cascadia Code" panose="020B0609020000020004" pitchFamily="49" charset="0"/>
-              </a:rPr>
-              <a:t>OWNER:</a:t>
-            </a:r>
-            <a:r>
-              <a:rPr lang="en-GB" sz="500" spc="150" dirty="0">
-                <a:solidFill>
-                  <a:srgbClr val="00FF00"/>
-                </a:solidFill>
-                <a:effectLst>
-                  <a:outerShdw blurRad="38100" dist="38100" dir="2700000" algn="tl">
-                    <a:srgbClr val="000000">
-                      <a:alpha val="43137"/>
-                    </a:srgbClr>
-                  </a:outerShdw>
-                </a:effectLst>
-                <a:latin typeface="Cascadia Code" panose="020B0609020000020004" pitchFamily="49" charset="0"/>
-                <a:ea typeface="Cascadia Code" panose="020B0609020000020004" pitchFamily="49" charset="0"/>
-                <a:cs typeface="Cascadia Code" panose="020B0609020000020004" pitchFamily="49" charset="0"/>
-              </a:rPr>
-              <a:t>MATTHEW DODDS     </a:t>
-            </a:r>
-            <a:r>
-              <a:rPr lang="en-GB" sz="500" spc="150" dirty="0">
-                <a:solidFill>
-                  <a:schemeClr val="bg1">
-                    <a:lumMod val="95000"/>
-                  </a:schemeClr>
-                </a:solidFill>
-                <a:effectLst>
-                  <a:outerShdw blurRad="38100" dist="38100" dir="2700000" algn="tl">
-                    <a:srgbClr val="000000">
-                      <a:alpha val="43137"/>
-                    </a:srgbClr>
-                  </a:outerShdw>
-                </a:effectLst>
-                <a:latin typeface="Cascadia Code" panose="020B0609020000020004" pitchFamily="49" charset="0"/>
-                <a:ea typeface="Cascadia Code" panose="020B0609020000020004" pitchFamily="49" charset="0"/>
-                <a:cs typeface="Cascadia Code" panose="020B0609020000020004" pitchFamily="49" charset="0"/>
-              </a:rPr>
-              <a:t>START DATE:</a:t>
-            </a:r>
-            <a:r>
-              <a:rPr lang="en-GB" sz="500" spc="150" dirty="0">
-                <a:solidFill>
-                  <a:srgbClr val="00FF00"/>
-                </a:solidFill>
-                <a:effectLst>
-                  <a:outerShdw blurRad="38100" dist="38100" dir="2700000" algn="tl">
-                    <a:srgbClr val="000000">
-                      <a:alpha val="43137"/>
-                    </a:srgbClr>
-                  </a:outerShdw>
-                </a:effectLst>
-                <a:latin typeface="Cascadia Code" panose="020B0609020000020004" pitchFamily="49" charset="0"/>
-                <a:ea typeface="Cascadia Code" panose="020B0609020000020004" pitchFamily="49" charset="0"/>
-                <a:cs typeface="Cascadia Code" panose="020B0609020000020004" pitchFamily="49" charset="0"/>
-              </a:rPr>
-              <a:t>24/11/25</a:t>
-            </a:r>
-            <a:r>
-              <a:rPr lang="en-GB" sz="500" spc="150" dirty="0">
-                <a:solidFill>
-                  <a:schemeClr val="bg1">
-                    <a:lumMod val="95000"/>
-                  </a:schemeClr>
-                </a:solidFill>
-                <a:effectLst>
-                  <a:outerShdw blurRad="38100" dist="38100" dir="2700000" algn="tl">
-                    <a:srgbClr val="000000">
-                      <a:alpha val="43137"/>
-                    </a:srgbClr>
-                  </a:outerShdw>
-                </a:effectLst>
-                <a:latin typeface="Cascadia Code" panose="020B0609020000020004" pitchFamily="49" charset="0"/>
-                <a:ea typeface="Cascadia Code" panose="020B0609020000020004" pitchFamily="49" charset="0"/>
-                <a:cs typeface="Cascadia Code" panose="020B0609020000020004" pitchFamily="49" charset="0"/>
-              </a:rPr>
-              <a:t>     STATUS:</a:t>
-            </a:r>
-            <a:r>
-              <a:rPr lang="en-GB" sz="500" spc="150" dirty="0">
-                <a:solidFill>
-                  <a:srgbClr val="00FF00"/>
-                </a:solidFill>
-                <a:effectLst>
-                  <a:outerShdw blurRad="38100" dist="38100" dir="2700000" algn="tl">
-                    <a:srgbClr val="000000">
-                      <a:alpha val="43137"/>
-                    </a:srgbClr>
-                  </a:outerShdw>
-                </a:effectLst>
-                <a:latin typeface="Cascadia Code" panose="020B0609020000020004" pitchFamily="49" charset="0"/>
-                <a:ea typeface="Cascadia Code" panose="020B0609020000020004" pitchFamily="49" charset="0"/>
-                <a:cs typeface="Cascadia Code" panose="020B0609020000020004" pitchFamily="49" charset="0"/>
-              </a:rPr>
-              <a:t>IN</a:t>
-            </a:r>
-            <a:r>
-              <a:rPr lang="en-GB" sz="500" spc="150" dirty="0">
-                <a:solidFill>
-                  <a:schemeClr val="bg1">
-                    <a:lumMod val="95000"/>
-                  </a:schemeClr>
-                </a:solidFill>
-                <a:effectLst>
-                  <a:outerShdw blurRad="38100" dist="38100" dir="2700000" algn="tl">
-                    <a:srgbClr val="000000">
-                      <a:alpha val="43137"/>
-                    </a:srgbClr>
-                  </a:outerShdw>
-                </a:effectLst>
-                <a:latin typeface="Cascadia Code" panose="020B0609020000020004" pitchFamily="49" charset="0"/>
-                <a:ea typeface="Cascadia Code" panose="020B0609020000020004" pitchFamily="49" charset="0"/>
-                <a:cs typeface="Cascadia Code" panose="020B0609020000020004" pitchFamily="49" charset="0"/>
-              </a:rPr>
-              <a:t> </a:t>
-            </a:r>
-            <a:r>
-              <a:rPr lang="en-GB" sz="500" spc="150" dirty="0">
-                <a:solidFill>
-                  <a:srgbClr val="00FF00"/>
-                </a:solidFill>
-                <a:effectLst>
-                  <a:outerShdw blurRad="38100" dist="38100" dir="2700000" algn="tl">
-                    <a:srgbClr val="000000">
-                      <a:alpha val="43137"/>
-                    </a:srgbClr>
-                  </a:outerShdw>
-                </a:effectLst>
-                <a:latin typeface="Cascadia Code" panose="020B0609020000020004" pitchFamily="49" charset="0"/>
-                <a:ea typeface="Cascadia Code" panose="020B0609020000020004" pitchFamily="49" charset="0"/>
-                <a:cs typeface="Cascadia Code" panose="020B0609020000020004" pitchFamily="49" charset="0"/>
-              </a:rPr>
-              <a:t>DEVELOPMENT      </a:t>
-            </a:r>
-            <a:r>
-              <a:rPr lang="en-GB" sz="500" spc="150" dirty="0">
-                <a:solidFill>
-                  <a:schemeClr val="bg1">
-                    <a:lumMod val="95000"/>
-                  </a:schemeClr>
-                </a:solidFill>
-                <a:effectLst>
-                  <a:outerShdw blurRad="38100" dist="38100" dir="2700000" algn="tl">
-                    <a:srgbClr val="000000">
-                      <a:alpha val="43137"/>
-                    </a:srgbClr>
-                  </a:outerShdw>
-                </a:effectLst>
-                <a:latin typeface="Cascadia Code" panose="020B0609020000020004" pitchFamily="49" charset="0"/>
-                <a:ea typeface="Cascadia Code" panose="020B0609020000020004" pitchFamily="49" charset="0"/>
-                <a:cs typeface="Cascadia Code" panose="020B0609020000020004" pitchFamily="49" charset="0"/>
-              </a:rPr>
-              <a:t>PROGRESS:</a:t>
-            </a:r>
-            <a:r>
-              <a:rPr lang="en-GB" sz="500" spc="150" dirty="0">
-                <a:solidFill>
-                  <a:srgbClr val="00FF00"/>
-                </a:solidFill>
-                <a:effectLst>
-                  <a:outerShdw blurRad="38100" dist="38100" dir="2700000" algn="tl">
-                    <a:srgbClr val="000000">
-                      <a:alpha val="43137"/>
-                    </a:srgbClr>
-                  </a:outerShdw>
-                </a:effectLst>
-                <a:latin typeface="Cascadia Code" panose="020B0609020000020004" pitchFamily="49" charset="0"/>
-                <a:ea typeface="Cascadia Code" panose="020B0609020000020004" pitchFamily="49" charset="0"/>
-                <a:cs typeface="Cascadia Code" panose="020B0609020000020004" pitchFamily="49" charset="0"/>
-              </a:rPr>
-              <a:t>15</a:t>
-            </a:r>
-            <a:r>
-              <a:rPr lang="en-GB" sz="500" spc="300" dirty="0">
-                <a:solidFill>
-                  <a:srgbClr val="00FF00"/>
-                </a:solidFill>
-                <a:effectLst>
-                  <a:outerShdw blurRad="38100" dist="38100" dir="2700000" algn="tl">
-                    <a:srgbClr val="000000">
-                      <a:alpha val="43137"/>
-                    </a:srgbClr>
-                  </a:outerShdw>
-                </a:effectLst>
-                <a:latin typeface="Cascadia Code" panose="020B0609020000020004" pitchFamily="49" charset="0"/>
-                <a:ea typeface="Cascadia Code" panose="020B0609020000020004" pitchFamily="49" charset="0"/>
-                <a:cs typeface="Cascadia Code" panose="020B0609020000020004" pitchFamily="49" charset="0"/>
-              </a:rPr>
-              <a:t>%</a:t>
-            </a:r>
-          </a:p>
-        </p:txBody>
-      </p:sp>
-      <p:sp>
-        <p:nvSpPr>
           <p:cNvPr id="26" name="TextBox 25">
             <a:extLst>
               <a:ext uri="{FF2B5EF4-FFF2-40B4-BE49-F238E27FC236}">
@@ -4961,10 +6015,10 @@
       </p:cxnSp>
       <p:grpSp>
         <p:nvGrpSpPr>
-          <p:cNvPr id="28" name="Group 27">
+          <p:cNvPr id="3" name="Group 2">
             <a:extLst>
               <a:ext uri="{FF2B5EF4-FFF2-40B4-BE49-F238E27FC236}">
-                <a16:creationId xmlns:a16="http://schemas.microsoft.com/office/drawing/2014/main" id="{E78CE5DE-E50C-639F-54C9-F510E1D54B32}"/>
+                <a16:creationId xmlns:a16="http://schemas.microsoft.com/office/drawing/2014/main" id="{4E5F1594-B012-25CA-4983-3D809FED4C5F}"/>
               </a:ext>
             </a:extLst>
           </p:cNvPr>
@@ -4973,108 +6027,368 @@
         </p:nvGrpSpPr>
         <p:grpSpPr>
           <a:xfrm>
-            <a:off x="5190691" y="6654350"/>
-            <a:ext cx="3327635" cy="5247"/>
-            <a:chOff x="6736189" y="6654350"/>
-            <a:chExt cx="3327635" cy="5247"/>
+            <a:off x="124618" y="6663659"/>
+            <a:ext cx="7567772" cy="169277"/>
+            <a:chOff x="124618" y="6578595"/>
+            <a:chExt cx="7567772" cy="169277"/>
           </a:xfrm>
         </p:grpSpPr>
-        <p:cxnSp>
-          <p:nvCxnSpPr>
-            <p:cNvPr id="29" name="Straight Connector 28">
+        <p:sp>
+          <p:nvSpPr>
+            <p:cNvPr id="25" name="TextBox 24">
               <a:extLst>
                 <a:ext uri="{FF2B5EF4-FFF2-40B4-BE49-F238E27FC236}">
-                  <a16:creationId xmlns:a16="http://schemas.microsoft.com/office/drawing/2014/main" id="{CAD7DB08-D882-8A04-4242-5146CB2DDCDA}"/>
+                  <a16:creationId xmlns:a16="http://schemas.microsoft.com/office/drawing/2014/main" id="{88997FA6-D161-C276-ABC1-C1083E5A76AA}"/>
                 </a:ext>
               </a:extLst>
             </p:cNvPr>
-            <p:cNvCxnSpPr>
-              <a:cxnSpLocks/>
-            </p:cNvCxnSpPr>
+            <p:cNvSpPr txBox="1"/>
             <p:nvPr/>
-          </p:nvCxnSpPr>
+          </p:nvSpPr>
           <p:spPr>
-            <a:xfrm flipV="1">
-              <a:off x="6744209" y="6654350"/>
-              <a:ext cx="3319615" cy="5247"/>
+            <a:xfrm>
+              <a:off x="124618" y="6578595"/>
+              <a:ext cx="7567772" cy="169277"/>
             </a:xfrm>
-            <a:prstGeom prst="line">
+            <a:prstGeom prst="rect">
               <a:avLst/>
             </a:prstGeom>
-            <a:ln w="6350">
-              <a:solidFill>
-                <a:schemeClr val="bg1"/>
-              </a:solidFill>
-            </a:ln>
+            <a:noFill/>
           </p:spPr>
-          <p:style>
-            <a:lnRef idx="2">
-              <a:schemeClr val="accent1"/>
-            </a:lnRef>
-            <a:fillRef idx="0">
-              <a:schemeClr val="accent1"/>
-            </a:fillRef>
-            <a:effectRef idx="1">
-              <a:schemeClr val="accent1"/>
-            </a:effectRef>
-            <a:fontRef idx="minor">
-              <a:schemeClr val="tx1"/>
-            </a:fontRef>
-          </p:style>
-        </p:cxnSp>
-        <p:cxnSp>
-          <p:nvCxnSpPr>
-            <p:cNvPr id="30" name="Straight Connector 29">
+          <p:txBody>
+            <a:bodyPr wrap="square" rtlCol="0" anchor="ctr" anchorCtr="0">
+              <a:spAutoFit/>
+            </a:bodyPr>
+            <a:lstStyle/>
+            <a:p>
+              <a:r>
+                <a:rPr lang="en-GB" sz="500" spc="150" dirty="0">
+                  <a:solidFill>
+                    <a:schemeClr val="bg1">
+                      <a:lumMod val="95000"/>
+                    </a:schemeClr>
+                  </a:solidFill>
+                  <a:effectLst>
+                    <a:outerShdw blurRad="38100" dist="38100" dir="2700000" algn="tl">
+                      <a:srgbClr val="000000">
+                        <a:alpha val="43137"/>
+                      </a:srgbClr>
+                    </a:outerShdw>
+                  </a:effectLst>
+                  <a:latin typeface="Cascadia Code" panose="020B0609020000020004" pitchFamily="49" charset="0"/>
+                  <a:ea typeface="Cascadia Code" panose="020B0609020000020004" pitchFamily="49" charset="0"/>
+                  <a:cs typeface="Cascadia Code" panose="020B0609020000020004" pitchFamily="49" charset="0"/>
+                </a:rPr>
+                <a:t>OWNER:</a:t>
+              </a:r>
+              <a:r>
+                <a:rPr lang="en-GB" sz="500" spc="150" dirty="0">
+                  <a:solidFill>
+                    <a:srgbClr val="00FF00"/>
+                  </a:solidFill>
+                  <a:effectLst>
+                    <a:outerShdw blurRad="38100" dist="38100" dir="2700000" algn="tl">
+                      <a:srgbClr val="000000">
+                        <a:alpha val="43137"/>
+                      </a:srgbClr>
+                    </a:outerShdw>
+                  </a:effectLst>
+                  <a:latin typeface="Cascadia Code" panose="020B0609020000020004" pitchFamily="49" charset="0"/>
+                  <a:ea typeface="Cascadia Code" panose="020B0609020000020004" pitchFamily="49" charset="0"/>
+                  <a:cs typeface="Cascadia Code" panose="020B0609020000020004" pitchFamily="49" charset="0"/>
+                </a:rPr>
+                <a:t>MATTHEW DODDS </a:t>
+              </a:r>
+              <a:r>
+                <a:rPr lang="en-GB" sz="500" spc="150" dirty="0">
+                  <a:solidFill>
+                    <a:schemeClr val="bg1">
+                      <a:lumMod val="95000"/>
+                    </a:schemeClr>
+                  </a:solidFill>
+                  <a:effectLst>
+                    <a:outerShdw blurRad="38100" dist="38100" dir="2700000" algn="tl">
+                      <a:srgbClr val="000000">
+                        <a:alpha val="43137"/>
+                      </a:srgbClr>
+                    </a:outerShdw>
+                  </a:effectLst>
+                  <a:latin typeface="Cascadia Code" panose="020B0609020000020004" pitchFamily="49" charset="0"/>
+                  <a:ea typeface="Cascadia Code" panose="020B0609020000020004" pitchFamily="49" charset="0"/>
+                  <a:cs typeface="Cascadia Code" panose="020B0609020000020004" pitchFamily="49" charset="0"/>
+                </a:rPr>
+                <a:t>START DATE:</a:t>
+              </a:r>
+              <a:r>
+                <a:rPr lang="en-GB" sz="500" spc="150" dirty="0">
+                  <a:solidFill>
+                    <a:srgbClr val="00FF00"/>
+                  </a:solidFill>
+                  <a:effectLst>
+                    <a:outerShdw blurRad="38100" dist="38100" dir="2700000" algn="tl">
+                      <a:srgbClr val="000000">
+                        <a:alpha val="43137"/>
+                      </a:srgbClr>
+                    </a:outerShdw>
+                  </a:effectLst>
+                  <a:latin typeface="Cascadia Code" panose="020B0609020000020004" pitchFamily="49" charset="0"/>
+                  <a:ea typeface="Cascadia Code" panose="020B0609020000020004" pitchFamily="49" charset="0"/>
+                  <a:cs typeface="Cascadia Code" panose="020B0609020000020004" pitchFamily="49" charset="0"/>
+                </a:rPr>
+                <a:t>24/11/25</a:t>
+              </a:r>
+              <a:r>
+                <a:rPr lang="en-GB" sz="500" spc="150" dirty="0">
+                  <a:solidFill>
+                    <a:schemeClr val="bg1">
+                      <a:lumMod val="95000"/>
+                    </a:schemeClr>
+                  </a:solidFill>
+                  <a:effectLst>
+                    <a:outerShdw blurRad="38100" dist="38100" dir="2700000" algn="tl">
+                      <a:srgbClr val="000000">
+                        <a:alpha val="43137"/>
+                      </a:srgbClr>
+                    </a:outerShdw>
+                  </a:effectLst>
+                  <a:latin typeface="Cascadia Code" panose="020B0609020000020004" pitchFamily="49" charset="0"/>
+                  <a:ea typeface="Cascadia Code" panose="020B0609020000020004" pitchFamily="49" charset="0"/>
+                  <a:cs typeface="Cascadia Code" panose="020B0609020000020004" pitchFamily="49" charset="0"/>
+                </a:rPr>
+                <a:t> STATUS:</a:t>
+              </a:r>
+              <a:r>
+                <a:rPr lang="en-GB" sz="500" spc="150" dirty="0">
+                  <a:solidFill>
+                    <a:srgbClr val="00FF00"/>
+                  </a:solidFill>
+                  <a:effectLst>
+                    <a:outerShdw blurRad="38100" dist="38100" dir="2700000" algn="tl">
+                      <a:srgbClr val="000000">
+                        <a:alpha val="43137"/>
+                      </a:srgbClr>
+                    </a:outerShdw>
+                  </a:effectLst>
+                  <a:latin typeface="Cascadia Code" panose="020B0609020000020004" pitchFamily="49" charset="0"/>
+                  <a:ea typeface="Cascadia Code" panose="020B0609020000020004" pitchFamily="49" charset="0"/>
+                  <a:cs typeface="Cascadia Code" panose="020B0609020000020004" pitchFamily="49" charset="0"/>
+                </a:rPr>
+                <a:t>IN</a:t>
+              </a:r>
+              <a:r>
+                <a:rPr lang="en-GB" sz="500" spc="150" dirty="0">
+                  <a:solidFill>
+                    <a:schemeClr val="bg1">
+                      <a:lumMod val="95000"/>
+                    </a:schemeClr>
+                  </a:solidFill>
+                  <a:effectLst>
+                    <a:outerShdw blurRad="38100" dist="38100" dir="2700000" algn="tl">
+                      <a:srgbClr val="000000">
+                        <a:alpha val="43137"/>
+                      </a:srgbClr>
+                    </a:outerShdw>
+                  </a:effectLst>
+                  <a:latin typeface="Cascadia Code" panose="020B0609020000020004" pitchFamily="49" charset="0"/>
+                  <a:ea typeface="Cascadia Code" panose="020B0609020000020004" pitchFamily="49" charset="0"/>
+                  <a:cs typeface="Cascadia Code" panose="020B0609020000020004" pitchFamily="49" charset="0"/>
+                </a:rPr>
+                <a:t> </a:t>
+              </a:r>
+              <a:r>
+                <a:rPr lang="en-GB" sz="500" spc="150" dirty="0">
+                  <a:solidFill>
+                    <a:srgbClr val="00FF00"/>
+                  </a:solidFill>
+                  <a:effectLst>
+                    <a:outerShdw blurRad="38100" dist="38100" dir="2700000" algn="tl">
+                      <a:srgbClr val="000000">
+                        <a:alpha val="43137"/>
+                      </a:srgbClr>
+                    </a:outerShdw>
+                  </a:effectLst>
+                  <a:latin typeface="Cascadia Code" panose="020B0609020000020004" pitchFamily="49" charset="0"/>
+                  <a:ea typeface="Cascadia Code" panose="020B0609020000020004" pitchFamily="49" charset="0"/>
+                  <a:cs typeface="Cascadia Code" panose="020B0609020000020004" pitchFamily="49" charset="0"/>
+                </a:rPr>
+                <a:t>DEVELOPMENT </a:t>
+              </a:r>
+              <a:r>
+                <a:rPr lang="en-GB" sz="500" spc="150" dirty="0">
+                  <a:solidFill>
+                    <a:schemeClr val="bg1">
+                      <a:lumMod val="95000"/>
+                    </a:schemeClr>
+                  </a:solidFill>
+                  <a:effectLst>
+                    <a:outerShdw blurRad="38100" dist="38100" dir="2700000" algn="tl">
+                      <a:srgbClr val="000000">
+                        <a:alpha val="43137"/>
+                      </a:srgbClr>
+                    </a:outerShdw>
+                  </a:effectLst>
+                  <a:latin typeface="Cascadia Code" panose="020B0609020000020004" pitchFamily="49" charset="0"/>
+                  <a:ea typeface="Cascadia Code" panose="020B0609020000020004" pitchFamily="49" charset="0"/>
+                  <a:cs typeface="Cascadia Code" panose="020B0609020000020004" pitchFamily="49" charset="0"/>
+                </a:rPr>
+                <a:t>PROGRESS:</a:t>
+              </a:r>
+              <a:r>
+                <a:rPr lang="en-GB" sz="500" spc="150" dirty="0">
+                  <a:solidFill>
+                    <a:srgbClr val="00FF00"/>
+                  </a:solidFill>
+                  <a:effectLst>
+                    <a:outerShdw blurRad="38100" dist="38100" dir="2700000" algn="tl">
+                      <a:srgbClr val="000000">
+                        <a:alpha val="43137"/>
+                      </a:srgbClr>
+                    </a:outerShdw>
+                  </a:effectLst>
+                  <a:latin typeface="Cascadia Code" panose="020B0609020000020004" pitchFamily="49" charset="0"/>
+                  <a:ea typeface="Cascadia Code" panose="020B0609020000020004" pitchFamily="49" charset="0"/>
+                  <a:cs typeface="Cascadia Code" panose="020B0609020000020004" pitchFamily="49" charset="0"/>
+                </a:rPr>
+                <a:t>15</a:t>
+              </a:r>
+              <a:r>
+                <a:rPr lang="en-GB" sz="500" spc="300" dirty="0">
+                  <a:solidFill>
+                    <a:srgbClr val="00FF00"/>
+                  </a:solidFill>
+                  <a:effectLst>
+                    <a:outerShdw blurRad="38100" dist="38100" dir="2700000" algn="tl">
+                      <a:srgbClr val="000000">
+                        <a:alpha val="43137"/>
+                      </a:srgbClr>
+                    </a:outerShdw>
+                  </a:effectLst>
+                  <a:latin typeface="Cascadia Code" panose="020B0609020000020004" pitchFamily="49" charset="0"/>
+                  <a:ea typeface="Cascadia Code" panose="020B0609020000020004" pitchFamily="49" charset="0"/>
+                  <a:cs typeface="Cascadia Code" panose="020B0609020000020004" pitchFamily="49" charset="0"/>
+                </a:rPr>
+                <a:t>%</a:t>
+              </a:r>
+            </a:p>
+          </p:txBody>
+        </p:sp>
+        <p:grpSp>
+          <p:nvGrpSpPr>
+            <p:cNvPr id="28" name="Group 27">
               <a:extLst>
                 <a:ext uri="{FF2B5EF4-FFF2-40B4-BE49-F238E27FC236}">
-                  <a16:creationId xmlns:a16="http://schemas.microsoft.com/office/drawing/2014/main" id="{919D88B7-3CC7-C445-5305-99EDEE2E5A45}"/>
+                  <a16:creationId xmlns:a16="http://schemas.microsoft.com/office/drawing/2014/main" id="{E78CE5DE-E50C-639F-54C9-F510E1D54B32}"/>
                 </a:ext>
               </a:extLst>
             </p:cNvPr>
-            <p:cNvCxnSpPr>
-              <a:cxnSpLocks/>
-            </p:cNvCxnSpPr>
+            <p:cNvGrpSpPr/>
             <p:nvPr/>
-          </p:nvCxnSpPr>
-          <p:spPr>
+          </p:nvGrpSpPr>
+          <p:grpSpPr>
             <a:xfrm>
-              <a:off x="6736189" y="6657218"/>
-              <a:ext cx="566045" cy="0"/>
+              <a:off x="4385911" y="6657218"/>
+              <a:ext cx="602024" cy="2379"/>
+              <a:chOff x="5931409" y="6657218"/>
+              <a:chExt cx="602024" cy="2379"/>
             </a:xfrm>
-            <a:prstGeom prst="line">
-              <a:avLst/>
-            </a:prstGeom>
-            <a:ln w="6350">
-              <a:solidFill>
-                <a:schemeClr val="accent2">
-                  <a:lumMod val="75000"/>
-                </a:schemeClr>
-              </a:solidFill>
-            </a:ln>
-            <a:effectLst>
-              <a:glow rad="63500">
-                <a:schemeClr val="accent2">
-                  <a:satMod val="175000"/>
-                  <a:alpha val="40000"/>
-                </a:schemeClr>
-              </a:glow>
-            </a:effectLst>
-          </p:spPr>
-          <p:style>
-            <a:lnRef idx="2">
-              <a:schemeClr val="accent1"/>
-            </a:lnRef>
-            <a:fillRef idx="0">
-              <a:schemeClr val="accent1"/>
-            </a:fillRef>
-            <a:effectRef idx="1">
-              <a:schemeClr val="accent1"/>
-            </a:effectRef>
-            <a:fontRef idx="minor">
-              <a:schemeClr val="tx1"/>
-            </a:fontRef>
-          </p:style>
-        </p:cxnSp>
+          </p:grpSpPr>
+          <p:cxnSp>
+            <p:nvCxnSpPr>
+              <p:cNvPr id="29" name="Straight Connector 28">
+                <a:extLst>
+                  <a:ext uri="{FF2B5EF4-FFF2-40B4-BE49-F238E27FC236}">
+                    <a16:creationId xmlns:a16="http://schemas.microsoft.com/office/drawing/2014/main" id="{CAD7DB08-D882-8A04-4242-5146CB2DDCDA}"/>
+                  </a:ext>
+                </a:extLst>
+              </p:cNvPr>
+              <p:cNvCxnSpPr>
+                <a:cxnSpLocks/>
+              </p:cNvCxnSpPr>
+              <p:nvPr/>
+            </p:nvCxnSpPr>
+            <p:spPr>
+              <a:xfrm>
+                <a:off x="5931409" y="6659597"/>
+                <a:ext cx="602024" cy="0"/>
+              </a:xfrm>
+              <a:prstGeom prst="line">
+                <a:avLst/>
+              </a:prstGeom>
+              <a:ln w="6350">
+                <a:solidFill>
+                  <a:schemeClr val="bg1"/>
+                </a:solidFill>
+              </a:ln>
+            </p:spPr>
+            <p:style>
+              <a:lnRef idx="2">
+                <a:schemeClr val="accent1"/>
+              </a:lnRef>
+              <a:fillRef idx="0">
+                <a:schemeClr val="accent1"/>
+              </a:fillRef>
+              <a:effectRef idx="1">
+                <a:schemeClr val="accent1"/>
+              </a:effectRef>
+              <a:fontRef idx="minor">
+                <a:schemeClr val="tx1"/>
+              </a:fontRef>
+            </p:style>
+          </p:cxnSp>
+          <p:cxnSp>
+            <p:nvCxnSpPr>
+              <p:cNvPr id="30" name="Straight Connector 29">
+                <a:extLst>
+                  <a:ext uri="{FF2B5EF4-FFF2-40B4-BE49-F238E27FC236}">
+                    <a16:creationId xmlns:a16="http://schemas.microsoft.com/office/drawing/2014/main" id="{919D88B7-3CC7-C445-5305-99EDEE2E5A45}"/>
+                  </a:ext>
+                </a:extLst>
+              </p:cNvPr>
+              <p:cNvCxnSpPr>
+                <a:cxnSpLocks/>
+              </p:cNvCxnSpPr>
+              <p:nvPr/>
+            </p:nvCxnSpPr>
+            <p:spPr>
+              <a:xfrm>
+                <a:off x="5948789" y="6657218"/>
+                <a:ext cx="255069" cy="0"/>
+              </a:xfrm>
+              <a:prstGeom prst="line">
+                <a:avLst/>
+              </a:prstGeom>
+              <a:ln w="6350">
+                <a:solidFill>
+                  <a:schemeClr val="accent2">
+                    <a:lumMod val="75000"/>
+                  </a:schemeClr>
+                </a:solidFill>
+              </a:ln>
+              <a:effectLst>
+                <a:glow rad="63500">
+                  <a:schemeClr val="accent2">
+                    <a:satMod val="175000"/>
+                    <a:alpha val="40000"/>
+                  </a:schemeClr>
+                </a:glow>
+              </a:effectLst>
+            </p:spPr>
+            <p:style>
+              <a:lnRef idx="2">
+                <a:schemeClr val="accent1"/>
+              </a:lnRef>
+              <a:fillRef idx="0">
+                <a:schemeClr val="accent1"/>
+              </a:fillRef>
+              <a:effectRef idx="1">
+                <a:schemeClr val="accent1"/>
+              </a:effectRef>
+              <a:fontRef idx="minor">
+                <a:schemeClr val="tx1"/>
+              </a:fontRef>
+            </p:style>
+          </p:cxnSp>
+        </p:grpSp>
       </p:grpSp>
       <p:cxnSp>
         <p:nvCxnSpPr>
@@ -6879,8 +8193,8 @@
         </p:nvSpPr>
         <p:spPr>
           <a:xfrm>
-            <a:off x="7341636" y="1285791"/>
-            <a:ext cx="232141" cy="261609"/>
+            <a:off x="7355633" y="1319719"/>
+            <a:ext cx="204148" cy="193207"/>
           </a:xfrm>
           <a:prstGeom prst="ellipse">
             <a:avLst/>
@@ -6953,13 +8267,14 @@
                   </a:schemeClr>
                 </a:gs>
                 <a:gs pos="16000">
-                  <a:schemeClr val="bg2">
-                    <a:lumMod val="75000"/>
+                  <a:schemeClr val="accent4">
+                    <a:lumMod val="60000"/>
+                    <a:lumOff val="40000"/>
                   </a:schemeClr>
                 </a:gs>
                 <a:gs pos="100000">
-                  <a:schemeClr val="bg2">
-                    <a:lumMod val="50000"/>
+                  <a:schemeClr val="accent4">
+                    <a:lumMod val="75000"/>
                   </a:schemeClr>
                 </a:gs>
               </a:gsLst>
@@ -7012,7 +8327,7 @@
         </p:nvSpPr>
         <p:spPr>
           <a:xfrm>
-            <a:off x="4958768" y="5736526"/>
+            <a:off x="4853993" y="5736526"/>
             <a:ext cx="2676701" cy="338554"/>
           </a:xfrm>
           <a:prstGeom prst="rect">
@@ -7165,7 +8480,7 @@
 </p:sld>
 </file>
 
-<file path=ppt/slides/slide3.xml><?xml version="1.0" encoding="utf-8"?>
+<file path=ppt/slides/slide4.xml><?xml version="1.0" encoding="utf-8"?>
 <p:sld xmlns:a="http://schemas.openxmlformats.org/drawingml/2006/main" xmlns:r="http://schemas.openxmlformats.org/officeDocument/2006/relationships" xmlns:p="http://schemas.openxmlformats.org/presentationml/2006/main">
   <p:cSld>
     <p:spTree>
@@ -8719,61 +10034,6 @@
       </p:grpSp>
       <p:sp>
         <p:nvSpPr>
-          <p:cNvPr id="95" name="Oval 94">
-            <a:extLst>
-              <a:ext uri="{FF2B5EF4-FFF2-40B4-BE49-F238E27FC236}">
-                <a16:creationId xmlns:a16="http://schemas.microsoft.com/office/drawing/2014/main" id="{84D387BA-9669-8738-25D6-1A58CE4D7FF1}"/>
-              </a:ext>
-            </a:extLst>
-          </p:cNvPr>
-          <p:cNvSpPr/>
-          <p:nvPr/>
-        </p:nvSpPr>
-        <p:spPr>
-          <a:xfrm>
-            <a:off x="7369220" y="1287226"/>
-            <a:ext cx="232141" cy="261609"/>
-          </a:xfrm>
-          <a:prstGeom prst="ellipse">
-            <a:avLst/>
-          </a:prstGeom>
-          <a:blipFill>
-            <a:blip r:embed="rId3"/>
-            <a:stretch>
-              <a:fillRect/>
-            </a:stretch>
-          </a:blipFill>
-          <a:ln>
-            <a:noFill/>
-          </a:ln>
-        </p:spPr>
-        <p:style>
-          <a:lnRef idx="2">
-            <a:schemeClr val="accent1">
-              <a:shade val="15000"/>
-            </a:schemeClr>
-          </a:lnRef>
-          <a:fillRef idx="1">
-            <a:schemeClr val="accent1"/>
-          </a:fillRef>
-          <a:effectRef idx="0">
-            <a:schemeClr val="accent1"/>
-          </a:effectRef>
-          <a:fontRef idx="minor">
-            <a:schemeClr val="lt1"/>
-          </a:fontRef>
-        </p:style>
-        <p:txBody>
-          <a:bodyPr rtlCol="0" anchor="ctr"/>
-          <a:lstStyle/>
-          <a:p>
-            <a:pPr algn="ctr"/>
-            <a:endParaRPr lang="en-GB"/>
-          </a:p>
-        </p:txBody>
-      </p:sp>
-      <p:sp>
-        <p:nvSpPr>
           <p:cNvPr id="96" name="Rectangle: Rounded Corners 95">
             <a:extLst>
               <a:ext uri="{FF2B5EF4-FFF2-40B4-BE49-F238E27FC236}">
@@ -9109,7 +10369,7 @@
         </p:nvCxnSpPr>
         <p:spPr>
           <a:xfrm>
-            <a:off x="243232" y="2595018"/>
+            <a:off x="243232" y="2637550"/>
             <a:ext cx="11744567" cy="0"/>
           </a:xfrm>
           <a:prstGeom prst="line">
@@ -10844,6 +12104,61 @@
           </a:p>
         </p:txBody>
       </p:sp>
+      <p:sp>
+        <p:nvSpPr>
+          <p:cNvPr id="3" name="Oval 2">
+            <a:extLst>
+              <a:ext uri="{FF2B5EF4-FFF2-40B4-BE49-F238E27FC236}">
+                <a16:creationId xmlns:a16="http://schemas.microsoft.com/office/drawing/2014/main" id="{B31A8A6F-23DF-99DE-5881-D88ECE8C0FC6}"/>
+              </a:ext>
+            </a:extLst>
+          </p:cNvPr>
+          <p:cNvSpPr/>
+          <p:nvPr/>
+        </p:nvSpPr>
+        <p:spPr>
+          <a:xfrm>
+            <a:off x="7401898" y="1321427"/>
+            <a:ext cx="204148" cy="193207"/>
+          </a:xfrm>
+          <a:prstGeom prst="ellipse">
+            <a:avLst/>
+          </a:prstGeom>
+          <a:blipFill>
+            <a:blip r:embed="rId3"/>
+            <a:stretch>
+              <a:fillRect/>
+            </a:stretch>
+          </a:blipFill>
+          <a:ln>
+            <a:noFill/>
+          </a:ln>
+        </p:spPr>
+        <p:style>
+          <a:lnRef idx="2">
+            <a:schemeClr val="accent1">
+              <a:shade val="15000"/>
+            </a:schemeClr>
+          </a:lnRef>
+          <a:fillRef idx="1">
+            <a:schemeClr val="accent1"/>
+          </a:fillRef>
+          <a:effectRef idx="0">
+            <a:schemeClr val="accent1"/>
+          </a:effectRef>
+          <a:fontRef idx="minor">
+            <a:schemeClr val="lt1"/>
+          </a:fontRef>
+        </p:style>
+        <p:txBody>
+          <a:bodyPr rtlCol="0" anchor="ctr"/>
+          <a:lstStyle/>
+          <a:p>
+            <a:pPr algn="ctr"/>
+            <a:endParaRPr lang="en-GB"/>
+          </a:p>
+        </p:txBody>
+      </p:sp>
     </p:spTree>
     <p:extLst>
       <p:ext uri="{BB962C8B-B14F-4D97-AF65-F5344CB8AC3E}">
@@ -10857,7 +12172,7 @@
 </p:sld>
 </file>
 
-<file path=ppt/slides/slide4.xml><?xml version="1.0" encoding="utf-8"?>
+<file path=ppt/slides/slide5.xml><?xml version="1.0" encoding="utf-8"?>
 <p:sld xmlns:a="http://schemas.openxmlformats.org/drawingml/2006/main" xmlns:r="http://schemas.openxmlformats.org/officeDocument/2006/relationships" xmlns:p="http://schemas.openxmlformats.org/presentationml/2006/main">
   <p:cSld>
     <p:spTree>
@@ -12378,61 +13693,6 @@
       </p:grpSp>
       <p:sp>
         <p:nvSpPr>
-          <p:cNvPr id="95" name="Oval 94">
-            <a:extLst>
-              <a:ext uri="{FF2B5EF4-FFF2-40B4-BE49-F238E27FC236}">
-                <a16:creationId xmlns:a16="http://schemas.microsoft.com/office/drawing/2014/main" id="{88A92E13-BC9E-AD6B-F749-6481714452C6}"/>
-              </a:ext>
-            </a:extLst>
-          </p:cNvPr>
-          <p:cNvSpPr/>
-          <p:nvPr/>
-        </p:nvSpPr>
-        <p:spPr>
-          <a:xfrm>
-            <a:off x="7238416" y="1287226"/>
-            <a:ext cx="232141" cy="261609"/>
-          </a:xfrm>
-          <a:prstGeom prst="ellipse">
-            <a:avLst/>
-          </a:prstGeom>
-          <a:blipFill>
-            <a:blip r:embed="rId3"/>
-            <a:stretch>
-              <a:fillRect/>
-            </a:stretch>
-          </a:blipFill>
-          <a:ln>
-            <a:noFill/>
-          </a:ln>
-        </p:spPr>
-        <p:style>
-          <a:lnRef idx="2">
-            <a:schemeClr val="accent1">
-              <a:shade val="15000"/>
-            </a:schemeClr>
-          </a:lnRef>
-          <a:fillRef idx="1">
-            <a:schemeClr val="accent1"/>
-          </a:fillRef>
-          <a:effectRef idx="0">
-            <a:schemeClr val="accent1"/>
-          </a:effectRef>
-          <a:fontRef idx="minor">
-            <a:schemeClr val="lt1"/>
-          </a:fontRef>
-        </p:style>
-        <p:txBody>
-          <a:bodyPr rtlCol="0" anchor="ctr"/>
-          <a:lstStyle/>
-          <a:p>
-            <a:pPr algn="ctr"/>
-            <a:endParaRPr lang="en-GB"/>
-          </a:p>
-        </p:txBody>
-      </p:sp>
-      <p:sp>
-        <p:nvSpPr>
           <p:cNvPr id="96" name="Rectangle: Rounded Corners 95">
             <a:extLst>
               <a:ext uri="{FF2B5EF4-FFF2-40B4-BE49-F238E27FC236}">
@@ -12582,7 +13842,7 @@
         </p:nvGrpSpPr>
         <p:grpSpPr>
           <a:xfrm>
-            <a:off x="2762303" y="1894963"/>
+            <a:off x="2832476" y="1810218"/>
             <a:ext cx="1301073" cy="215444"/>
             <a:chOff x="199842" y="2261729"/>
             <a:chExt cx="1301073" cy="215444"/>
@@ -13199,7 +14459,7 @@
         </p:nvGrpSpPr>
         <p:grpSpPr>
           <a:xfrm>
-            <a:off x="4133277" y="1756262"/>
+            <a:off x="4203450" y="1671517"/>
             <a:ext cx="4726303" cy="357735"/>
             <a:chOff x="1570816" y="1756262"/>
             <a:chExt cx="4726303" cy="357735"/>
@@ -16170,6 +17430,112 @@
           </a:p>
         </p:txBody>
       </p:sp>
+      <p:sp>
+        <p:nvSpPr>
+          <p:cNvPr id="74" name="TextBox 73">
+            <a:extLst>
+              <a:ext uri="{FF2B5EF4-FFF2-40B4-BE49-F238E27FC236}">
+                <a16:creationId xmlns:a16="http://schemas.microsoft.com/office/drawing/2014/main" id="{9921A843-D704-84EE-C8ED-7F6915EA8BDC}"/>
+              </a:ext>
+            </a:extLst>
+          </p:cNvPr>
+          <p:cNvSpPr txBox="1"/>
+          <p:nvPr/>
+        </p:nvSpPr>
+        <p:spPr>
+          <a:xfrm>
+            <a:off x="4222873" y="2043434"/>
+            <a:ext cx="2443162" cy="215444"/>
+          </a:xfrm>
+          <a:prstGeom prst="rect">
+            <a:avLst/>
+          </a:prstGeom>
+          <a:noFill/>
+        </p:spPr>
+        <p:txBody>
+          <a:bodyPr wrap="square">
+            <a:spAutoFit/>
+          </a:bodyPr>
+          <a:lstStyle/>
+          <a:p>
+            <a:r>
+              <a:rPr lang="en-GB" sz="800" i="1" spc="150" dirty="0">
+                <a:solidFill>
+                  <a:schemeClr val="bg1">
+                    <a:lumMod val="65000"/>
+                  </a:schemeClr>
+                </a:solidFill>
+                <a:latin typeface="Candara" panose="020E0502030303020204" pitchFamily="34" charset="0"/>
+                <a:ea typeface="Cascadia Code" panose="020B0609020000020004" pitchFamily="49" charset="0"/>
+                <a:cs typeface="Cascadia Code" panose="020B0609020000020004" pitchFamily="49" charset="0"/>
+              </a:rPr>
+              <a:t>LO1: Explain…</a:t>
+            </a:r>
+            <a:endParaRPr lang="en-GB" i="1" dirty="0">
+              <a:solidFill>
+                <a:schemeClr val="bg1">
+                  <a:lumMod val="65000"/>
+                </a:schemeClr>
+              </a:solidFill>
+            </a:endParaRPr>
+          </a:p>
+        </p:txBody>
+      </p:sp>
+      <p:sp>
+        <p:nvSpPr>
+          <p:cNvPr id="72" name="Oval 71">
+            <a:extLst>
+              <a:ext uri="{FF2B5EF4-FFF2-40B4-BE49-F238E27FC236}">
+                <a16:creationId xmlns:a16="http://schemas.microsoft.com/office/drawing/2014/main" id="{71901250-16DC-DCD7-2ECB-78A3868C36D4}"/>
+              </a:ext>
+            </a:extLst>
+          </p:cNvPr>
+          <p:cNvSpPr/>
+          <p:nvPr/>
+        </p:nvSpPr>
+        <p:spPr>
+          <a:xfrm>
+            <a:off x="7274080" y="1319719"/>
+            <a:ext cx="204148" cy="193207"/>
+          </a:xfrm>
+          <a:prstGeom prst="ellipse">
+            <a:avLst/>
+          </a:prstGeom>
+          <a:blipFill>
+            <a:blip r:embed="rId3"/>
+            <a:stretch>
+              <a:fillRect/>
+            </a:stretch>
+          </a:blipFill>
+          <a:ln>
+            <a:noFill/>
+          </a:ln>
+        </p:spPr>
+        <p:style>
+          <a:lnRef idx="2">
+            <a:schemeClr val="accent1">
+              <a:shade val="15000"/>
+            </a:schemeClr>
+          </a:lnRef>
+          <a:fillRef idx="1">
+            <a:schemeClr val="accent1"/>
+          </a:fillRef>
+          <a:effectRef idx="0">
+            <a:schemeClr val="accent1"/>
+          </a:effectRef>
+          <a:fontRef idx="minor">
+            <a:schemeClr val="lt1"/>
+          </a:fontRef>
+        </p:style>
+        <p:txBody>
+          <a:bodyPr rtlCol="0" anchor="ctr"/>
+          <a:lstStyle/>
+          <a:p>
+            <a:pPr algn="ctr"/>
+            <a:endParaRPr lang="en-GB"/>
+          </a:p>
+        </p:txBody>
+      </p:sp>
     </p:spTree>
     <p:extLst>
       <p:ext uri="{BB962C8B-B14F-4D97-AF65-F5344CB8AC3E}">
@@ -16183,7 +17549,7 @@
 </p:sld>
 </file>
 
-<file path=ppt/slides/slide5.xml><?xml version="1.0" encoding="utf-8"?>
+<file path=ppt/slides/slide6.xml><?xml version="1.0" encoding="utf-8"?>
 <p:sld xmlns:a="http://schemas.openxmlformats.org/drawingml/2006/main" xmlns:r="http://schemas.openxmlformats.org/officeDocument/2006/relationships" xmlns:p="http://schemas.openxmlformats.org/presentationml/2006/main">
   <p:cSld>
     <p:spTree>
@@ -17702,61 +19068,6 @@
           </p:sp>
         </p:grpSp>
       </p:grpSp>
-      <p:sp>
-        <p:nvSpPr>
-          <p:cNvPr id="95" name="Oval 94">
-            <a:extLst>
-              <a:ext uri="{FF2B5EF4-FFF2-40B4-BE49-F238E27FC236}">
-                <a16:creationId xmlns:a16="http://schemas.microsoft.com/office/drawing/2014/main" id="{4C052397-6DB2-CC96-AAF7-D4220A876F38}"/>
-              </a:ext>
-            </a:extLst>
-          </p:cNvPr>
-          <p:cNvSpPr/>
-          <p:nvPr/>
-        </p:nvSpPr>
-        <p:spPr>
-          <a:xfrm>
-            <a:off x="7341636" y="1287226"/>
-            <a:ext cx="232141" cy="261609"/>
-          </a:xfrm>
-          <a:prstGeom prst="ellipse">
-            <a:avLst/>
-          </a:prstGeom>
-          <a:blipFill>
-            <a:blip r:embed="rId3"/>
-            <a:stretch>
-              <a:fillRect/>
-            </a:stretch>
-          </a:blipFill>
-          <a:ln>
-            <a:noFill/>
-          </a:ln>
-        </p:spPr>
-        <p:style>
-          <a:lnRef idx="2">
-            <a:schemeClr val="accent1">
-              <a:shade val="15000"/>
-            </a:schemeClr>
-          </a:lnRef>
-          <a:fillRef idx="1">
-            <a:schemeClr val="accent1"/>
-          </a:fillRef>
-          <a:effectRef idx="0">
-            <a:schemeClr val="accent1"/>
-          </a:effectRef>
-          <a:fontRef idx="minor">
-            <a:schemeClr val="lt1"/>
-          </a:fontRef>
-        </p:style>
-        <p:txBody>
-          <a:bodyPr rtlCol="0" anchor="ctr"/>
-          <a:lstStyle/>
-          <a:p>
-            <a:pPr algn="ctr"/>
-            <a:endParaRPr lang="en-GB"/>
-          </a:p>
-        </p:txBody>
-      </p:sp>
       <p:sp>
         <p:nvSpPr>
           <p:cNvPr id="96" name="Rectangle: Rounded Corners 95">
@@ -22019,6 +23330,61 @@
           </a:p>
         </p:txBody>
       </p:sp>
+      <p:sp>
+        <p:nvSpPr>
+          <p:cNvPr id="5" name="Oval 4">
+            <a:extLst>
+              <a:ext uri="{FF2B5EF4-FFF2-40B4-BE49-F238E27FC236}">
+                <a16:creationId xmlns:a16="http://schemas.microsoft.com/office/drawing/2014/main" id="{D428CFBC-ECD4-FA15-C921-E7BE60D235A2}"/>
+              </a:ext>
+            </a:extLst>
+          </p:cNvPr>
+          <p:cNvSpPr/>
+          <p:nvPr/>
+        </p:nvSpPr>
+        <p:spPr>
+          <a:xfrm>
+            <a:off x="7355633" y="1321427"/>
+            <a:ext cx="204148" cy="193207"/>
+          </a:xfrm>
+          <a:prstGeom prst="ellipse">
+            <a:avLst/>
+          </a:prstGeom>
+          <a:blipFill>
+            <a:blip r:embed="rId3"/>
+            <a:stretch>
+              <a:fillRect/>
+            </a:stretch>
+          </a:blipFill>
+          <a:ln>
+            <a:noFill/>
+          </a:ln>
+        </p:spPr>
+        <p:style>
+          <a:lnRef idx="2">
+            <a:schemeClr val="accent1">
+              <a:shade val="15000"/>
+            </a:schemeClr>
+          </a:lnRef>
+          <a:fillRef idx="1">
+            <a:schemeClr val="accent1"/>
+          </a:fillRef>
+          <a:effectRef idx="0">
+            <a:schemeClr val="accent1"/>
+          </a:effectRef>
+          <a:fontRef idx="minor">
+            <a:schemeClr val="lt1"/>
+          </a:fontRef>
+        </p:style>
+        <p:txBody>
+          <a:bodyPr rtlCol="0" anchor="ctr"/>
+          <a:lstStyle/>
+          <a:p>
+            <a:pPr algn="ctr"/>
+            <a:endParaRPr lang="en-GB"/>
+          </a:p>
+        </p:txBody>
+      </p:sp>
     </p:spTree>
     <p:extLst>
       <p:ext uri="{BB962C8B-B14F-4D97-AF65-F5344CB8AC3E}">
@@ -22032,7 +23398,7 @@
 </p:sld>
 </file>
 
-<file path=ppt/slides/slide6.xml><?xml version="1.0" encoding="utf-8"?>
+<file path=ppt/slides/slide7.xml><?xml version="1.0" encoding="utf-8"?>
 <p:sld xmlns:a="http://schemas.openxmlformats.org/drawingml/2006/main" xmlns:r="http://schemas.openxmlformats.org/officeDocument/2006/relationships" xmlns:p="http://schemas.openxmlformats.org/presentationml/2006/main">
   <p:cSld>
     <p:spTree>
@@ -23550,61 +24916,6 @@
       </p:grpSp>
       <p:sp>
         <p:nvSpPr>
-          <p:cNvPr id="95" name="Oval 94">
-            <a:extLst>
-              <a:ext uri="{FF2B5EF4-FFF2-40B4-BE49-F238E27FC236}">
-                <a16:creationId xmlns:a16="http://schemas.microsoft.com/office/drawing/2014/main" id="{1D57ABE6-2219-CDD3-982B-775AC47142BD}"/>
-              </a:ext>
-            </a:extLst>
-          </p:cNvPr>
-          <p:cNvSpPr/>
-          <p:nvPr/>
-        </p:nvSpPr>
-        <p:spPr>
-          <a:xfrm>
-            <a:off x="7635920" y="1287226"/>
-            <a:ext cx="232141" cy="261609"/>
-          </a:xfrm>
-          <a:prstGeom prst="ellipse">
-            <a:avLst/>
-          </a:prstGeom>
-          <a:blipFill>
-            <a:blip r:embed="rId3"/>
-            <a:stretch>
-              <a:fillRect/>
-            </a:stretch>
-          </a:blipFill>
-          <a:ln>
-            <a:noFill/>
-          </a:ln>
-        </p:spPr>
-        <p:style>
-          <a:lnRef idx="2">
-            <a:schemeClr val="accent1">
-              <a:shade val="15000"/>
-            </a:schemeClr>
-          </a:lnRef>
-          <a:fillRef idx="1">
-            <a:schemeClr val="accent1"/>
-          </a:fillRef>
-          <a:effectRef idx="0">
-            <a:schemeClr val="accent1"/>
-          </a:effectRef>
-          <a:fontRef idx="minor">
-            <a:schemeClr val="lt1"/>
-          </a:fontRef>
-        </p:style>
-        <p:txBody>
-          <a:bodyPr rtlCol="0" anchor="ctr"/>
-          <a:lstStyle/>
-          <a:p>
-            <a:pPr algn="ctr"/>
-            <a:endParaRPr lang="en-GB"/>
-          </a:p>
-        </p:txBody>
-      </p:sp>
-      <p:sp>
-        <p:nvSpPr>
           <p:cNvPr id="96" name="Rectangle: Rounded Corners 95">
             <a:extLst>
               <a:ext uri="{FF2B5EF4-FFF2-40B4-BE49-F238E27FC236}">
@@ -24416,7 +25727,7 @@
         </p:nvSpPr>
         <p:spPr>
           <a:xfrm>
-            <a:off x="1756644" y="2517082"/>
+            <a:off x="1756644" y="2431357"/>
             <a:ext cx="2015451" cy="188453"/>
           </a:xfrm>
           <a:prstGeom prst="rect">
@@ -24462,7 +25773,7 @@
         </p:nvSpPr>
         <p:spPr>
           <a:xfrm>
-            <a:off x="2190226" y="2501738"/>
+            <a:off x="2190226" y="2416013"/>
             <a:ext cx="2303365" cy="204511"/>
           </a:xfrm>
           <a:prstGeom prst="roundRect">
@@ -24540,7 +25851,7 @@
         </p:nvSpPr>
         <p:spPr>
           <a:xfrm rot="17976276">
-            <a:off x="4359201" y="2560317"/>
+            <a:off x="4359201" y="2474592"/>
             <a:ext cx="81690" cy="70810"/>
           </a:xfrm>
           <a:prstGeom prst="triangle">
@@ -24594,7 +25905,7 @@
         </p:nvSpPr>
         <p:spPr>
           <a:xfrm>
-            <a:off x="4648829" y="2516368"/>
+            <a:off x="4648829" y="2430643"/>
             <a:ext cx="2015451" cy="188453"/>
           </a:xfrm>
           <a:prstGeom prst="rect">
@@ -24640,7 +25951,7 @@
         </p:nvSpPr>
         <p:spPr>
           <a:xfrm>
-            <a:off x="5558661" y="2501024"/>
+            <a:off x="5558661" y="2415299"/>
             <a:ext cx="2303365" cy="204511"/>
           </a:xfrm>
           <a:prstGeom prst="roundRect">
@@ -24718,7 +26029,7 @@
         </p:nvSpPr>
         <p:spPr>
           <a:xfrm rot="17976276">
-            <a:off x="7727636" y="2559603"/>
+            <a:off x="7727636" y="2473878"/>
             <a:ext cx="81690" cy="70810"/>
           </a:xfrm>
           <a:prstGeom prst="triangle">
@@ -24772,7 +26083,7 @@
         </p:nvSpPr>
         <p:spPr>
           <a:xfrm>
-            <a:off x="7962850" y="2516368"/>
+            <a:off x="7962850" y="2430643"/>
             <a:ext cx="2015451" cy="188453"/>
           </a:xfrm>
           <a:prstGeom prst="rect">
@@ -24818,7 +26129,7 @@
         </p:nvSpPr>
         <p:spPr>
           <a:xfrm>
-            <a:off x="8358333" y="2501025"/>
+            <a:off x="8358333" y="2415300"/>
             <a:ext cx="632006" cy="203796"/>
           </a:xfrm>
           <a:prstGeom prst="roundRect">
@@ -24896,7 +26207,7 @@
         </p:nvSpPr>
         <p:spPr>
           <a:xfrm rot="17976276">
-            <a:off x="8869957" y="2559603"/>
+            <a:off x="8869957" y="2473878"/>
             <a:ext cx="81690" cy="70810"/>
           </a:xfrm>
           <a:prstGeom prst="triangle">
@@ -24950,7 +26261,7 @@
         </p:nvSpPr>
         <p:spPr>
           <a:xfrm>
-            <a:off x="9121369" y="2516368"/>
+            <a:off x="9121369" y="2430643"/>
             <a:ext cx="632007" cy="184666"/>
           </a:xfrm>
           <a:prstGeom prst="rect">
@@ -24996,7 +26307,7 @@
         </p:nvSpPr>
         <p:spPr>
           <a:xfrm>
-            <a:off x="9697827" y="2501025"/>
+            <a:off x="9697827" y="2415300"/>
             <a:ext cx="632006" cy="203796"/>
           </a:xfrm>
           <a:prstGeom prst="roundRect">
@@ -25074,7 +26385,7 @@
         </p:nvSpPr>
         <p:spPr>
           <a:xfrm rot="17976276">
-            <a:off x="10209451" y="2559603"/>
+            <a:off x="10209451" y="2473878"/>
             <a:ext cx="81690" cy="70810"/>
           </a:xfrm>
           <a:prstGeom prst="triangle">
@@ -25128,7 +26439,7 @@
         </p:nvGrpSpPr>
         <p:grpSpPr>
           <a:xfrm>
-            <a:off x="4524912" y="3269960"/>
+            <a:off x="4524912" y="4993985"/>
             <a:ext cx="1324587" cy="413329"/>
             <a:chOff x="5885838" y="3149016"/>
             <a:chExt cx="1324587" cy="413329"/>
@@ -25288,7 +26599,7 @@
         </p:nvGrpSpPr>
         <p:grpSpPr>
           <a:xfrm>
-            <a:off x="6600499" y="3269479"/>
+            <a:off x="6600499" y="4993504"/>
             <a:ext cx="1324587" cy="413329"/>
             <a:chOff x="5885838" y="3149016"/>
             <a:chExt cx="1324587" cy="413329"/>
@@ -25452,7 +26763,7 @@
         </p:nvSpPr>
         <p:spPr>
           <a:xfrm>
-            <a:off x="2801155" y="4165101"/>
+            <a:off x="2801155" y="5565276"/>
             <a:ext cx="6991925" cy="188452"/>
           </a:xfrm>
           <a:prstGeom prst="rect">
@@ -25617,6 +26928,186 @@
               <a:ea typeface="Cascadia Code" panose="020B0609020000020004" pitchFamily="49" charset="0"/>
               <a:cs typeface="Cascadia Code" panose="020B0609020000020004" pitchFamily="49" charset="0"/>
             </a:endParaRPr>
+          </a:p>
+        </p:txBody>
+      </p:sp>
+      <p:sp>
+        <p:nvSpPr>
+          <p:cNvPr id="3" name="Rectangle: Rounded Corners 2">
+            <a:extLst>
+              <a:ext uri="{FF2B5EF4-FFF2-40B4-BE49-F238E27FC236}">
+                <a16:creationId xmlns:a16="http://schemas.microsoft.com/office/drawing/2014/main" id="{7FCF06DF-B034-70FB-12D5-5D9A78421DB2}"/>
+              </a:ext>
+            </a:extLst>
+          </p:cNvPr>
+          <p:cNvSpPr/>
+          <p:nvPr/>
+        </p:nvSpPr>
+        <p:spPr>
+          <a:xfrm>
+            <a:off x="3542074" y="3021338"/>
+            <a:ext cx="5337543" cy="1764703"/>
+          </a:xfrm>
+          <a:prstGeom prst="roundRect">
+            <a:avLst>
+              <a:gd name="adj" fmla="val 18131"/>
+            </a:avLst>
+          </a:prstGeom>
+          <a:noFill/>
+          <a:ln w="6350" cap="sq">
+            <a:gradFill flip="none" rotWithShape="1">
+              <a:gsLst>
+                <a:gs pos="0">
+                  <a:schemeClr val="accent5">
+                    <a:lumMod val="0"/>
+                    <a:lumOff val="100000"/>
+                  </a:schemeClr>
+                </a:gs>
+                <a:gs pos="46000">
+                  <a:schemeClr val="bg2">
+                    <a:lumMod val="75000"/>
+                  </a:schemeClr>
+                </a:gs>
+                <a:gs pos="100000">
+                  <a:schemeClr val="bg2">
+                    <a:lumMod val="50000"/>
+                  </a:schemeClr>
+                </a:gs>
+              </a:gsLst>
+              <a:path path="circle">
+                <a:fillToRect l="50000" t="50000" r="50000" b="50000"/>
+              </a:path>
+              <a:tileRect/>
+            </a:gradFill>
+            <a:round/>
+          </a:ln>
+        </p:spPr>
+        <p:style>
+          <a:lnRef idx="2">
+            <a:schemeClr val="accent1">
+              <a:shade val="15000"/>
+            </a:schemeClr>
+          </a:lnRef>
+          <a:fillRef idx="1">
+            <a:schemeClr val="accent1"/>
+          </a:fillRef>
+          <a:effectRef idx="0">
+            <a:schemeClr val="accent1"/>
+          </a:effectRef>
+          <a:fontRef idx="minor">
+            <a:schemeClr val="lt1"/>
+          </a:fontRef>
+        </p:style>
+        <p:txBody>
+          <a:bodyPr rtlCol="0" anchor="ctr"/>
+          <a:lstStyle/>
+          <a:p>
+            <a:pPr algn="ctr"/>
+            <a:endParaRPr lang="en-GB" sz="1600">
+              <a:latin typeface="Candara" panose="020E0502030303020204" pitchFamily="34" charset="0"/>
+            </a:endParaRPr>
+          </a:p>
+        </p:txBody>
+      </p:sp>
+      <p:sp>
+        <p:nvSpPr>
+          <p:cNvPr id="5" name="TextBox 4">
+            <a:extLst>
+              <a:ext uri="{FF2B5EF4-FFF2-40B4-BE49-F238E27FC236}">
+                <a16:creationId xmlns:a16="http://schemas.microsoft.com/office/drawing/2014/main" id="{0009D96E-FDC2-82C7-E181-443F8AF51486}"/>
+              </a:ext>
+            </a:extLst>
+          </p:cNvPr>
+          <p:cNvSpPr txBox="1"/>
+          <p:nvPr/>
+        </p:nvSpPr>
+        <p:spPr>
+          <a:xfrm>
+            <a:off x="5694600" y="2780576"/>
+            <a:ext cx="802800" cy="230832"/>
+          </a:xfrm>
+          <a:prstGeom prst="rect">
+            <a:avLst/>
+          </a:prstGeom>
+          <a:noFill/>
+          <a:effectLst/>
+        </p:spPr>
+        <p:txBody>
+          <a:bodyPr wrap="square" rtlCol="0">
+            <a:spAutoFit/>
+          </a:bodyPr>
+          <a:lstStyle/>
+          <a:p>
+            <a:pPr algn="ctr"/>
+            <a:r>
+              <a:rPr lang="en-GB" sz="900" spc="150" dirty="0">
+                <a:solidFill>
+                  <a:schemeClr val="bg1">
+                    <a:lumMod val="95000"/>
+                  </a:schemeClr>
+                </a:solidFill>
+                <a:effectLst/>
+                <a:latin typeface="Candara" panose="020E0502030303020204" pitchFamily="34" charset="0"/>
+                <a:ea typeface="Cascadia Code" panose="020B0609020000020004" pitchFamily="49" charset="0"/>
+                <a:cs typeface="Cascadia Code" panose="020B0609020000020004" pitchFamily="49" charset="0"/>
+              </a:rPr>
+              <a:t>Preview:</a:t>
+            </a:r>
+          </a:p>
+        </p:txBody>
+      </p:sp>
+      <p:sp>
+        <p:nvSpPr>
+          <p:cNvPr id="8" name="Oval 7">
+            <a:extLst>
+              <a:ext uri="{FF2B5EF4-FFF2-40B4-BE49-F238E27FC236}">
+                <a16:creationId xmlns:a16="http://schemas.microsoft.com/office/drawing/2014/main" id="{9C39EF30-00BF-480A-06A3-AE75E5D24457}"/>
+              </a:ext>
+            </a:extLst>
+          </p:cNvPr>
+          <p:cNvSpPr/>
+          <p:nvPr/>
+        </p:nvSpPr>
+        <p:spPr>
+          <a:xfrm>
+            <a:off x="7717368" y="1316827"/>
+            <a:ext cx="204148" cy="193207"/>
+          </a:xfrm>
+          <a:prstGeom prst="ellipse">
+            <a:avLst/>
+          </a:prstGeom>
+          <a:blipFill>
+            <a:blip r:embed="rId3"/>
+            <a:stretch>
+              <a:fillRect/>
+            </a:stretch>
+          </a:blipFill>
+          <a:ln>
+            <a:noFill/>
+          </a:ln>
+        </p:spPr>
+        <p:style>
+          <a:lnRef idx="2">
+            <a:schemeClr val="accent1">
+              <a:shade val="15000"/>
+            </a:schemeClr>
+          </a:lnRef>
+          <a:fillRef idx="1">
+            <a:schemeClr val="accent1"/>
+          </a:fillRef>
+          <a:effectRef idx="0">
+            <a:schemeClr val="accent1"/>
+          </a:effectRef>
+          <a:fontRef idx="minor">
+            <a:schemeClr val="lt1"/>
+          </a:fontRef>
+        </p:style>
+        <p:txBody>
+          <a:bodyPr rtlCol="0" anchor="ctr"/>
+          <a:lstStyle/>
+          <a:p>
+            <a:pPr algn="ctr"/>
+            <a:endParaRPr lang="en-GB"/>
           </a:p>
         </p:txBody>
       </p:sp>

</xml_diff>